<commit_message>
J'ai ajouté le fichier texte
</commit_message>
<xml_diff>
--- a/Cahier de charge/Smart Windows.pptx
+++ b/Cahier de charge/Smart Windows.pptx
@@ -110,6 +110,11 @@
       </a:defRPr>
     </a:lvl9pPr>
   </p:defaultTextStyle>
+  <p:extLst>
+    <p:ext uri="{EFAFB233-063F-42B5-8137-9DF3F51BA10A}">
+      <p15:sldGuideLst xmlns:p15="http://schemas.microsoft.com/office/powerpoint/2012/main"/>
+    </p:ext>
+  </p:extLst>
 </p:presentation>
 </file>
 
@@ -520,7 +525,7 @@
           <a:noFill/>
           <a:extLst>
             <a:ext uri="{909E8E84-426E-40dd-AFC4-6F175D3DCCD1}">
-              <a14:hiddenFill xmlns:a14="http://schemas.microsoft.com/office/drawing/2010/main" xmlns="">
+              <a14:hiddenFill xmlns="" xmlns:a14="http://schemas.microsoft.com/office/drawing/2010/main">
                 <a:solidFill>
                   <a:srgbClr val="FFFFFF"/>
                 </a:solidFill>
@@ -579,7 +584,7 @@
             </a:ln>
             <a:extLst>
               <a:ext uri="{91240B29-F687-4f45-9708-019B960494DF}">
-                <a14:hiddenLine xmlns:a14="http://schemas.microsoft.com/office/drawing/2010/main" xmlns="" w="9525">
+                <a14:hiddenLine xmlns="" xmlns:a14="http://schemas.microsoft.com/office/drawing/2010/main" w="9525">
                   <a:solidFill>
                     <a:srgbClr val="000000"/>
                   </a:solidFill>
@@ -669,7 +674,7 @@
             </a:ln>
             <a:extLst>
               <a:ext uri="{91240B29-F687-4f45-9708-019B960494DF}">
-                <a14:hiddenLine xmlns:a14="http://schemas.microsoft.com/office/drawing/2010/main" xmlns="" w="9525">
+                <a14:hiddenLine xmlns="" xmlns:a14="http://schemas.microsoft.com/office/drawing/2010/main" w="9525">
                   <a:solidFill>
                     <a:srgbClr val="000000"/>
                   </a:solidFill>
@@ -759,7 +764,7 @@
             </a:ln>
             <a:extLst>
               <a:ext uri="{91240B29-F687-4f45-9708-019B960494DF}">
-                <a14:hiddenLine xmlns:a14="http://schemas.microsoft.com/office/drawing/2010/main" xmlns="" w="9525">
+                <a14:hiddenLine xmlns="" xmlns:a14="http://schemas.microsoft.com/office/drawing/2010/main" w="9525">
                   <a:solidFill>
                     <a:srgbClr val="000000"/>
                   </a:solidFill>
@@ -793,7 +798,7 @@
             </a:ln>
             <a:extLst>
               <a:ext uri="{91240B29-F687-4f45-9708-019B960494DF}">
-                <a14:hiddenLine xmlns:a14="http://schemas.microsoft.com/office/drawing/2010/main" xmlns="" w="9525">
+                <a14:hiddenLine xmlns="" xmlns:a14="http://schemas.microsoft.com/office/drawing/2010/main" w="9525">
                   <a:solidFill>
                     <a:srgbClr val="000000"/>
                   </a:solidFill>
@@ -883,7 +888,7 @@
             </a:ln>
             <a:extLst>
               <a:ext uri="{91240B29-F687-4f45-9708-019B960494DF}">
-                <a14:hiddenLine xmlns:a14="http://schemas.microsoft.com/office/drawing/2010/main" xmlns="" w="9525">
+                <a14:hiddenLine xmlns="" xmlns:a14="http://schemas.microsoft.com/office/drawing/2010/main" w="9525">
                   <a:solidFill>
                     <a:srgbClr val="000000"/>
                   </a:solidFill>
@@ -945,7 +950,7 @@
             </a:ln>
             <a:extLst>
               <a:ext uri="{91240B29-F687-4f45-9708-019B960494DF}">
-                <a14:hiddenLine xmlns:a14="http://schemas.microsoft.com/office/drawing/2010/main" xmlns="" w="9525">
+                <a14:hiddenLine xmlns="" xmlns:a14="http://schemas.microsoft.com/office/drawing/2010/main" w="9525">
                   <a:solidFill>
                     <a:srgbClr val="000000"/>
                   </a:solidFill>
@@ -1007,7 +1012,7 @@
             </a:ln>
             <a:extLst>
               <a:ext uri="{91240B29-F687-4f45-9708-019B960494DF}">
-                <a14:hiddenLine xmlns:a14="http://schemas.microsoft.com/office/drawing/2010/main" xmlns="" w="9525">
+                <a14:hiddenLine xmlns="" xmlns:a14="http://schemas.microsoft.com/office/drawing/2010/main" w="9525">
                   <a:solidFill>
                     <a:srgbClr val="000000"/>
                   </a:solidFill>
@@ -1097,7 +1102,7 @@
             </a:ln>
             <a:extLst>
               <a:ext uri="{91240B29-F687-4f45-9708-019B960494DF}">
-                <a14:hiddenLine xmlns:a14="http://schemas.microsoft.com/office/drawing/2010/main" xmlns="" w="9525">
+                <a14:hiddenLine xmlns="" xmlns:a14="http://schemas.microsoft.com/office/drawing/2010/main" w="9525">
                   <a:solidFill>
                     <a:srgbClr val="000000"/>
                   </a:solidFill>
@@ -1159,7 +1164,7 @@
             </a:ln>
             <a:extLst>
               <a:ext uri="{91240B29-F687-4f45-9708-019B960494DF}">
-                <a14:hiddenLine xmlns:a14="http://schemas.microsoft.com/office/drawing/2010/main" xmlns="" w="9525">
+                <a14:hiddenLine xmlns="" xmlns:a14="http://schemas.microsoft.com/office/drawing/2010/main" w="9525">
                   <a:solidFill>
                     <a:srgbClr val="000000"/>
                   </a:solidFill>
@@ -1221,7 +1226,7 @@
             </a:ln>
             <a:extLst>
               <a:ext uri="{91240B29-F687-4f45-9708-019B960494DF}">
-                <a14:hiddenLine xmlns:a14="http://schemas.microsoft.com/office/drawing/2010/main" xmlns="" w="9525">
+                <a14:hiddenLine xmlns="" xmlns:a14="http://schemas.microsoft.com/office/drawing/2010/main" w="9525">
                   <a:solidFill>
                     <a:srgbClr val="000000"/>
                   </a:solidFill>
@@ -1311,7 +1316,7 @@
             </a:ln>
             <a:extLst>
               <a:ext uri="{91240B29-F687-4f45-9708-019B960494DF}">
-                <a14:hiddenLine xmlns:a14="http://schemas.microsoft.com/office/drawing/2010/main" xmlns="" w="9525">
+                <a14:hiddenLine xmlns="" xmlns:a14="http://schemas.microsoft.com/office/drawing/2010/main" w="9525">
                   <a:solidFill>
                     <a:srgbClr val="000000"/>
                   </a:solidFill>
@@ -1401,7 +1406,7 @@
             </a:ln>
             <a:extLst>
               <a:ext uri="{91240B29-F687-4f45-9708-019B960494DF}">
-                <a14:hiddenLine xmlns:a14="http://schemas.microsoft.com/office/drawing/2010/main" xmlns="" w="9525">
+                <a14:hiddenLine xmlns="" xmlns:a14="http://schemas.microsoft.com/office/drawing/2010/main" w="9525">
                   <a:solidFill>
                     <a:srgbClr val="000000"/>
                   </a:solidFill>
@@ -1463,7 +1468,7 @@
             </a:ln>
             <a:extLst>
               <a:ext uri="{91240B29-F687-4f45-9708-019B960494DF}">
-                <a14:hiddenLine xmlns:a14="http://schemas.microsoft.com/office/drawing/2010/main" xmlns="" w="9525">
+                <a14:hiddenLine xmlns="" xmlns:a14="http://schemas.microsoft.com/office/drawing/2010/main" w="9525">
                   <a:solidFill>
                     <a:srgbClr val="000000"/>
                   </a:solidFill>
@@ -1573,7 +1578,7 @@
             </a:ln>
             <a:extLst>
               <a:ext uri="{91240B29-F687-4f45-9708-019B960494DF}">
-                <a14:hiddenLine xmlns:a14="http://schemas.microsoft.com/office/drawing/2010/main" xmlns="" w="9525">
+                <a14:hiddenLine xmlns="" xmlns:a14="http://schemas.microsoft.com/office/drawing/2010/main" w="9525">
                   <a:solidFill>
                     <a:srgbClr val="000000"/>
                   </a:solidFill>
@@ -1635,7 +1640,7 @@
             </a:ln>
             <a:extLst>
               <a:ext uri="{91240B29-F687-4f45-9708-019B960494DF}">
-                <a14:hiddenLine xmlns:a14="http://schemas.microsoft.com/office/drawing/2010/main" xmlns="" w="9525">
+                <a14:hiddenLine xmlns="" xmlns:a14="http://schemas.microsoft.com/office/drawing/2010/main" w="9525">
                   <a:solidFill>
                     <a:srgbClr val="000000"/>
                   </a:solidFill>
@@ -1725,7 +1730,7 @@
             </a:ln>
             <a:extLst>
               <a:ext uri="{91240B29-F687-4f45-9708-019B960494DF}">
-                <a14:hiddenLine xmlns:a14="http://schemas.microsoft.com/office/drawing/2010/main" xmlns="" w="9525">
+                <a14:hiddenLine xmlns="" xmlns:a14="http://schemas.microsoft.com/office/drawing/2010/main" w="9525">
                   <a:solidFill>
                     <a:srgbClr val="000000"/>
                   </a:solidFill>
@@ -1815,7 +1820,7 @@
             </a:ln>
             <a:extLst>
               <a:ext uri="{91240B29-F687-4f45-9708-019B960494DF}">
-                <a14:hiddenLine xmlns:a14="http://schemas.microsoft.com/office/drawing/2010/main" xmlns="" w="9525">
+                <a14:hiddenLine xmlns="" xmlns:a14="http://schemas.microsoft.com/office/drawing/2010/main" w="9525">
                   <a:solidFill>
                     <a:srgbClr val="000000"/>
                   </a:solidFill>
@@ -1877,7 +1882,7 @@
             </a:ln>
             <a:extLst>
               <a:ext uri="{91240B29-F687-4f45-9708-019B960494DF}">
-                <a14:hiddenLine xmlns:a14="http://schemas.microsoft.com/office/drawing/2010/main" xmlns="" w="9525">
+                <a14:hiddenLine xmlns="" xmlns:a14="http://schemas.microsoft.com/office/drawing/2010/main" w="9525">
                   <a:solidFill>
                     <a:srgbClr val="000000"/>
                   </a:solidFill>
@@ -1967,7 +1972,7 @@
             </a:ln>
             <a:extLst>
               <a:ext uri="{91240B29-F687-4f45-9708-019B960494DF}">
-                <a14:hiddenLine xmlns:a14="http://schemas.microsoft.com/office/drawing/2010/main" xmlns="" w="9525">
+                <a14:hiddenLine xmlns="" xmlns:a14="http://schemas.microsoft.com/office/drawing/2010/main" w="9525">
                   <a:solidFill>
                     <a:srgbClr val="000000"/>
                   </a:solidFill>
@@ -2057,7 +2062,7 @@
             </a:ln>
             <a:extLst>
               <a:ext uri="{91240B29-F687-4f45-9708-019B960494DF}">
-                <a14:hiddenLine xmlns:a14="http://schemas.microsoft.com/office/drawing/2010/main" xmlns="" w="9525">
+                <a14:hiddenLine xmlns="" xmlns:a14="http://schemas.microsoft.com/office/drawing/2010/main" w="9525">
                   <a:solidFill>
                     <a:srgbClr val="000000"/>
                   </a:solidFill>
@@ -2113,7 +2118,7 @@
             </a:ln>
             <a:extLst>
               <a:ext uri="{91240B29-F687-4f45-9708-019B960494DF}">
-                <a14:hiddenLine xmlns:a14="http://schemas.microsoft.com/office/drawing/2010/main" xmlns="" w="9525">
+                <a14:hiddenLine xmlns="" xmlns:a14="http://schemas.microsoft.com/office/drawing/2010/main" w="9525">
                   <a:solidFill>
                     <a:srgbClr val="000000"/>
                   </a:solidFill>
@@ -2203,7 +2208,7 @@
             </a:ln>
             <a:extLst>
               <a:ext uri="{91240B29-F687-4f45-9708-019B960494DF}">
-                <a14:hiddenLine xmlns:a14="http://schemas.microsoft.com/office/drawing/2010/main" xmlns="" w="9525">
+                <a14:hiddenLine xmlns="" xmlns:a14="http://schemas.microsoft.com/office/drawing/2010/main" w="9525">
                   <a:solidFill>
                     <a:srgbClr val="000000"/>
                   </a:solidFill>
@@ -2259,7 +2264,7 @@
             </a:ln>
             <a:extLst>
               <a:ext uri="{91240B29-F687-4f45-9708-019B960494DF}">
-                <a14:hiddenLine xmlns:a14="http://schemas.microsoft.com/office/drawing/2010/main" xmlns="" w="9525">
+                <a14:hiddenLine xmlns="" xmlns:a14="http://schemas.microsoft.com/office/drawing/2010/main" w="9525">
                   <a:solidFill>
                     <a:srgbClr val="000000"/>
                   </a:solidFill>
@@ -2349,7 +2354,7 @@
             </a:ln>
             <a:extLst>
               <a:ext uri="{91240B29-F687-4f45-9708-019B960494DF}">
-                <a14:hiddenLine xmlns:a14="http://schemas.microsoft.com/office/drawing/2010/main" xmlns="" w="9525">
+                <a14:hiddenLine xmlns="" xmlns:a14="http://schemas.microsoft.com/office/drawing/2010/main" w="9525">
                   <a:solidFill>
                     <a:srgbClr val="000000"/>
                   </a:solidFill>
@@ -2417,7 +2422,7 @@
             </a:ln>
             <a:extLst>
               <a:ext uri="{91240B29-F687-4f45-9708-019B960494DF}">
-                <a14:hiddenLine xmlns:a14="http://schemas.microsoft.com/office/drawing/2010/main" xmlns="" w="9525">
+                <a14:hiddenLine xmlns="" xmlns:a14="http://schemas.microsoft.com/office/drawing/2010/main" w="9525">
                   <a:solidFill>
                     <a:srgbClr val="000000"/>
                   </a:solidFill>
@@ -2507,7 +2512,7 @@
             </a:ln>
             <a:extLst>
               <a:ext uri="{91240B29-F687-4f45-9708-019B960494DF}">
-                <a14:hiddenLine xmlns:a14="http://schemas.microsoft.com/office/drawing/2010/main" xmlns="" w="9525">
+                <a14:hiddenLine xmlns="" xmlns:a14="http://schemas.microsoft.com/office/drawing/2010/main" w="9525">
                   <a:solidFill>
                     <a:srgbClr val="000000"/>
                   </a:solidFill>
@@ -2575,7 +2580,7 @@
             </a:ln>
             <a:extLst>
               <a:ext uri="{91240B29-F687-4f45-9708-019B960494DF}">
-                <a14:hiddenLine xmlns:a14="http://schemas.microsoft.com/office/drawing/2010/main" xmlns="" w="9525">
+                <a14:hiddenLine xmlns="" xmlns:a14="http://schemas.microsoft.com/office/drawing/2010/main" w="9525">
                   <a:solidFill>
                     <a:srgbClr val="000000"/>
                   </a:solidFill>
@@ -2665,7 +2670,7 @@
             </a:ln>
             <a:extLst>
               <a:ext uri="{91240B29-F687-4f45-9708-019B960494DF}">
-                <a14:hiddenLine xmlns:a14="http://schemas.microsoft.com/office/drawing/2010/main" xmlns="" w="9525">
+                <a14:hiddenLine xmlns="" xmlns:a14="http://schemas.microsoft.com/office/drawing/2010/main" w="9525">
                   <a:solidFill>
                     <a:srgbClr val="000000"/>
                   </a:solidFill>
@@ -2699,7 +2704,7 @@
             </a:ln>
             <a:extLst>
               <a:ext uri="{91240B29-F687-4f45-9708-019B960494DF}">
-                <a14:hiddenLine xmlns:a14="http://schemas.microsoft.com/office/drawing/2010/main" xmlns="" w="9525">
+                <a14:hiddenLine xmlns="" xmlns:a14="http://schemas.microsoft.com/office/drawing/2010/main" w="9525">
                   <a:solidFill>
                     <a:srgbClr val="000000"/>
                   </a:solidFill>
@@ -2789,7 +2794,7 @@
             </a:ln>
             <a:extLst>
               <a:ext uri="{91240B29-F687-4f45-9708-019B960494DF}">
-                <a14:hiddenLine xmlns:a14="http://schemas.microsoft.com/office/drawing/2010/main" xmlns="" w="9525">
+                <a14:hiddenLine xmlns="" xmlns:a14="http://schemas.microsoft.com/office/drawing/2010/main" w="9525">
                   <a:solidFill>
                     <a:srgbClr val="000000"/>
                   </a:solidFill>
@@ -2851,7 +2856,7 @@
             </a:ln>
             <a:extLst>
               <a:ext uri="{91240B29-F687-4f45-9708-019B960494DF}">
-                <a14:hiddenLine xmlns:a14="http://schemas.microsoft.com/office/drawing/2010/main" xmlns="" w="9525">
+                <a14:hiddenLine xmlns="" xmlns:a14="http://schemas.microsoft.com/office/drawing/2010/main" w="9525">
                   <a:solidFill>
                     <a:srgbClr val="000000"/>
                   </a:solidFill>
@@ -2913,7 +2918,7 @@
             </a:ln>
             <a:extLst>
               <a:ext uri="{91240B29-F687-4f45-9708-019B960494DF}">
-                <a14:hiddenLine xmlns:a14="http://schemas.microsoft.com/office/drawing/2010/main" xmlns="" w="9525">
+                <a14:hiddenLine xmlns="" xmlns:a14="http://schemas.microsoft.com/office/drawing/2010/main" w="9525">
                   <a:solidFill>
                     <a:srgbClr val="000000"/>
                   </a:solidFill>
@@ -3003,7 +3008,7 @@
             </a:ln>
             <a:extLst>
               <a:ext uri="{91240B29-F687-4f45-9708-019B960494DF}">
-                <a14:hiddenLine xmlns:a14="http://schemas.microsoft.com/office/drawing/2010/main" xmlns="" w="9525">
+                <a14:hiddenLine xmlns="" xmlns:a14="http://schemas.microsoft.com/office/drawing/2010/main" w="9525">
                   <a:solidFill>
                     <a:srgbClr val="000000"/>
                   </a:solidFill>
@@ -3071,7 +3076,7 @@
             </a:ln>
             <a:extLst>
               <a:ext uri="{91240B29-F687-4f45-9708-019B960494DF}">
-                <a14:hiddenLine xmlns:a14="http://schemas.microsoft.com/office/drawing/2010/main" xmlns="" w="9525">
+                <a14:hiddenLine xmlns="" xmlns:a14="http://schemas.microsoft.com/office/drawing/2010/main" w="9525">
                   <a:solidFill>
                     <a:srgbClr val="000000"/>
                   </a:solidFill>
@@ -3133,7 +3138,7 @@
             </a:ln>
             <a:extLst>
               <a:ext uri="{91240B29-F687-4f45-9708-019B960494DF}">
-                <a14:hiddenLine xmlns:a14="http://schemas.microsoft.com/office/drawing/2010/main" xmlns="" w="9525">
+                <a14:hiddenLine xmlns="" xmlns:a14="http://schemas.microsoft.com/office/drawing/2010/main" w="9525">
                   <a:solidFill>
                     <a:srgbClr val="000000"/>
                   </a:solidFill>
@@ -3223,7 +3228,7 @@
             </a:ln>
             <a:extLst>
               <a:ext uri="{91240B29-F687-4f45-9708-019B960494DF}">
-                <a14:hiddenLine xmlns:a14="http://schemas.microsoft.com/office/drawing/2010/main" xmlns="" w="9525">
+                <a14:hiddenLine xmlns="" xmlns:a14="http://schemas.microsoft.com/office/drawing/2010/main" w="9525">
                   <a:solidFill>
                     <a:srgbClr val="000000"/>
                   </a:solidFill>
@@ -3285,7 +3290,7 @@
             </a:ln>
             <a:extLst>
               <a:ext uri="{91240B29-F687-4f45-9708-019B960494DF}">
-                <a14:hiddenLine xmlns:a14="http://schemas.microsoft.com/office/drawing/2010/main" xmlns="" w="9525">
+                <a14:hiddenLine xmlns="" xmlns:a14="http://schemas.microsoft.com/office/drawing/2010/main" w="9525">
                   <a:solidFill>
                     <a:srgbClr val="000000"/>
                   </a:solidFill>
@@ -3375,7 +3380,7 @@
             </a:ln>
             <a:extLst>
               <a:ext uri="{91240B29-F687-4f45-9708-019B960494DF}">
-                <a14:hiddenLine xmlns:a14="http://schemas.microsoft.com/office/drawing/2010/main" xmlns="" w="9525">
+                <a14:hiddenLine xmlns="" xmlns:a14="http://schemas.microsoft.com/office/drawing/2010/main" w="9525">
                   <a:solidFill>
                     <a:srgbClr val="000000"/>
                   </a:solidFill>
@@ -3437,7 +3442,7 @@
             </a:ln>
             <a:extLst>
               <a:ext uri="{91240B29-F687-4f45-9708-019B960494DF}">
-                <a14:hiddenLine xmlns:a14="http://schemas.microsoft.com/office/drawing/2010/main" xmlns="" w="9525">
+                <a14:hiddenLine xmlns="" xmlns:a14="http://schemas.microsoft.com/office/drawing/2010/main" w="9525">
                   <a:solidFill>
                     <a:srgbClr val="000000"/>
                   </a:solidFill>
@@ -3527,7 +3532,7 @@
             </a:ln>
             <a:extLst>
               <a:ext uri="{91240B29-F687-4f45-9708-019B960494DF}">
-                <a14:hiddenLine xmlns:a14="http://schemas.microsoft.com/office/drawing/2010/main" xmlns="" w="9525">
+                <a14:hiddenLine xmlns="" xmlns:a14="http://schemas.microsoft.com/office/drawing/2010/main" w="9525">
                   <a:solidFill>
                     <a:srgbClr val="000000"/>
                   </a:solidFill>
@@ -3561,7 +3566,7 @@
             </a:ln>
             <a:extLst>
               <a:ext uri="{91240B29-F687-4f45-9708-019B960494DF}">
-                <a14:hiddenLine xmlns:a14="http://schemas.microsoft.com/office/drawing/2010/main" xmlns="" w="9525">
+                <a14:hiddenLine xmlns="" xmlns:a14="http://schemas.microsoft.com/office/drawing/2010/main" w="9525">
                   <a:solidFill>
                     <a:srgbClr val="000000"/>
                   </a:solidFill>
@@ -3626,7 +3631,7 @@
             </a:ln>
             <a:extLst>
               <a:ext uri="{91240B29-F687-4f45-9708-019B960494DF}">
-                <a14:hiddenLine xmlns:a14="http://schemas.microsoft.com/office/drawing/2010/main" xmlns="" w="9525">
+                <a14:hiddenLine xmlns="" xmlns:a14="http://schemas.microsoft.com/office/drawing/2010/main" w="9525">
                   <a:solidFill>
                     <a:srgbClr val="000000"/>
                   </a:solidFill>
@@ -3716,7 +3721,7 @@
             </a:ln>
             <a:extLst>
               <a:ext uri="{91240B29-F687-4f45-9708-019B960494DF}">
-                <a14:hiddenLine xmlns:a14="http://schemas.microsoft.com/office/drawing/2010/main" xmlns="" w="9525">
+                <a14:hiddenLine xmlns="" xmlns:a14="http://schemas.microsoft.com/office/drawing/2010/main" w="9525">
                   <a:solidFill>
                     <a:srgbClr val="000000"/>
                   </a:solidFill>
@@ -3778,7 +3783,7 @@
             </a:ln>
             <a:extLst>
               <a:ext uri="{91240B29-F687-4f45-9708-019B960494DF}">
-                <a14:hiddenLine xmlns:a14="http://schemas.microsoft.com/office/drawing/2010/main" xmlns="" w="9525">
+                <a14:hiddenLine xmlns="" xmlns:a14="http://schemas.microsoft.com/office/drawing/2010/main" w="9525">
                   <a:solidFill>
                     <a:srgbClr val="000000"/>
                   </a:solidFill>
@@ -3868,7 +3873,7 @@
             </a:ln>
             <a:extLst>
               <a:ext uri="{91240B29-F687-4f45-9708-019B960494DF}">
-                <a14:hiddenLine xmlns:a14="http://schemas.microsoft.com/office/drawing/2010/main" xmlns="" w="9525">
+                <a14:hiddenLine xmlns="" xmlns:a14="http://schemas.microsoft.com/office/drawing/2010/main" w="9525">
                   <a:solidFill>
                     <a:srgbClr val="000000"/>
                   </a:solidFill>
@@ -3958,7 +3963,7 @@
             </a:ln>
             <a:extLst>
               <a:ext uri="{91240B29-F687-4f45-9708-019B960494DF}">
-                <a14:hiddenLine xmlns:a14="http://schemas.microsoft.com/office/drawing/2010/main" xmlns="" w="9525">
+                <a14:hiddenLine xmlns="" xmlns:a14="http://schemas.microsoft.com/office/drawing/2010/main" w="9525">
                   <a:solidFill>
                     <a:srgbClr val="000000"/>
                   </a:solidFill>
@@ -4023,7 +4028,7 @@
             </a:ln>
             <a:extLst>
               <a:ext uri="{91240B29-F687-4f45-9708-019B960494DF}">
-                <a14:hiddenLine xmlns:a14="http://schemas.microsoft.com/office/drawing/2010/main" xmlns="" w="9525">
+                <a14:hiddenLine xmlns="" xmlns:a14="http://schemas.microsoft.com/office/drawing/2010/main" w="9525">
                   <a:solidFill>
                     <a:srgbClr val="000000"/>
                   </a:solidFill>
@@ -4085,7 +4090,7 @@
             </a:ln>
             <a:extLst>
               <a:ext uri="{91240B29-F687-4f45-9708-019B960494DF}">
-                <a14:hiddenLine xmlns:a14="http://schemas.microsoft.com/office/drawing/2010/main" xmlns="" w="9525">
+                <a14:hiddenLine xmlns="" xmlns:a14="http://schemas.microsoft.com/office/drawing/2010/main" w="9525">
                   <a:solidFill>
                     <a:srgbClr val="000000"/>
                   </a:solidFill>
@@ -4175,7 +4180,7 @@
             </a:ln>
             <a:extLst>
               <a:ext uri="{91240B29-F687-4f45-9708-019B960494DF}">
-                <a14:hiddenLine xmlns:a14="http://schemas.microsoft.com/office/drawing/2010/main" xmlns="" w="9525">
+                <a14:hiddenLine xmlns="" xmlns:a14="http://schemas.microsoft.com/office/drawing/2010/main" w="9525">
                   <a:solidFill>
                     <a:srgbClr val="000000"/>
                   </a:solidFill>
@@ -4265,7 +4270,7 @@
             </a:ln>
             <a:extLst>
               <a:ext uri="{91240B29-F687-4f45-9708-019B960494DF}">
-                <a14:hiddenLine xmlns:a14="http://schemas.microsoft.com/office/drawing/2010/main" xmlns="" w="9525">
+                <a14:hiddenLine xmlns="" xmlns:a14="http://schemas.microsoft.com/office/drawing/2010/main" w="9525">
                   <a:solidFill>
                     <a:srgbClr val="000000"/>
                   </a:solidFill>
@@ -4327,7 +4332,7 @@
             </a:ln>
             <a:extLst>
               <a:ext uri="{91240B29-F687-4f45-9708-019B960494DF}">
-                <a14:hiddenLine xmlns:a14="http://schemas.microsoft.com/office/drawing/2010/main" xmlns="" w="9525">
+                <a14:hiddenLine xmlns="" xmlns:a14="http://schemas.microsoft.com/office/drawing/2010/main" w="9525">
                   <a:solidFill>
                     <a:srgbClr val="000000"/>
                   </a:solidFill>
@@ -4447,7 +4452,7 @@
             </a:ln>
             <a:extLst>
               <a:ext uri="{91240B29-F687-4f45-9708-019B960494DF}">
-                <a14:hiddenLine xmlns:a14="http://schemas.microsoft.com/office/drawing/2010/main" xmlns="" w="9525">
+                <a14:hiddenLine xmlns="" xmlns:a14="http://schemas.microsoft.com/office/drawing/2010/main" w="9525">
                   <a:solidFill>
                     <a:srgbClr val="000000"/>
                   </a:solidFill>
@@ -4515,7 +4520,7 @@
             </a:ln>
             <a:extLst>
               <a:ext uri="{91240B29-F687-4f45-9708-019B960494DF}">
-                <a14:hiddenLine xmlns:a14="http://schemas.microsoft.com/office/drawing/2010/main" xmlns="" w="9525">
+                <a14:hiddenLine xmlns="" xmlns:a14="http://schemas.microsoft.com/office/drawing/2010/main" w="9525">
                   <a:solidFill>
                     <a:srgbClr val="000000"/>
                   </a:solidFill>
@@ -4605,7 +4610,7 @@
             </a:ln>
             <a:extLst>
               <a:ext uri="{91240B29-F687-4f45-9708-019B960494DF}">
-                <a14:hiddenLine xmlns:a14="http://schemas.microsoft.com/office/drawing/2010/main" xmlns="" w="9525">
+                <a14:hiddenLine xmlns="" xmlns:a14="http://schemas.microsoft.com/office/drawing/2010/main" w="9525">
                   <a:solidFill>
                     <a:srgbClr val="000000"/>
                   </a:solidFill>
@@ -9425,7 +9430,7 @@
           <a:noFill/>
           <a:extLst>
             <a:ext uri="{909E8E84-426E-40dd-AFC4-6F175D3DCCD1}">
-              <a14:hiddenFill xmlns:a14="http://schemas.microsoft.com/office/drawing/2010/main" xmlns="">
+              <a14:hiddenFill xmlns="" xmlns:a14="http://schemas.microsoft.com/office/drawing/2010/main">
                 <a:solidFill>
                   <a:srgbClr val="FFFFFF"/>
                 </a:solidFill>
@@ -9499,7 +9504,7 @@
               </a:ln>
               <a:extLst>
                 <a:ext uri="{91240B29-F687-4f45-9708-019B960494DF}">
-                  <a14:hiddenLine xmlns:a14="http://schemas.microsoft.com/office/drawing/2010/main" xmlns="" w="9525">
+                  <a14:hiddenLine xmlns="" xmlns:a14="http://schemas.microsoft.com/office/drawing/2010/main" w="9525">
                     <a:solidFill>
                       <a:srgbClr val="000000"/>
                     </a:solidFill>
@@ -9589,7 +9594,7 @@
               </a:ln>
               <a:extLst>
                 <a:ext uri="{91240B29-F687-4f45-9708-019B960494DF}">
-                  <a14:hiddenLine xmlns:a14="http://schemas.microsoft.com/office/drawing/2010/main" xmlns="" w="9525">
+                  <a14:hiddenLine xmlns="" xmlns:a14="http://schemas.microsoft.com/office/drawing/2010/main" w="9525">
                     <a:solidFill>
                       <a:srgbClr val="000000"/>
                     </a:solidFill>
@@ -9679,7 +9684,7 @@
               </a:ln>
               <a:extLst>
                 <a:ext uri="{91240B29-F687-4f45-9708-019B960494DF}">
-                  <a14:hiddenLine xmlns:a14="http://schemas.microsoft.com/office/drawing/2010/main" xmlns="" w="9525">
+                  <a14:hiddenLine xmlns="" xmlns:a14="http://schemas.microsoft.com/office/drawing/2010/main" w="9525">
                     <a:solidFill>
                       <a:srgbClr val="000000"/>
                     </a:solidFill>
@@ -9741,7 +9746,7 @@
               </a:ln>
               <a:extLst>
                 <a:ext uri="{91240B29-F687-4f45-9708-019B960494DF}">
-                  <a14:hiddenLine xmlns:a14="http://schemas.microsoft.com/office/drawing/2010/main" xmlns="" w="9525">
+                  <a14:hiddenLine xmlns="" xmlns:a14="http://schemas.microsoft.com/office/drawing/2010/main" w="9525">
                     <a:solidFill>
                       <a:srgbClr val="000000"/>
                     </a:solidFill>
@@ -9831,7 +9836,7 @@
               </a:ln>
               <a:extLst>
                 <a:ext uri="{91240B29-F687-4f45-9708-019B960494DF}">
-                  <a14:hiddenLine xmlns:a14="http://schemas.microsoft.com/office/drawing/2010/main" xmlns="" w="9525">
+                  <a14:hiddenLine xmlns="" xmlns:a14="http://schemas.microsoft.com/office/drawing/2010/main" w="9525">
                     <a:solidFill>
                       <a:srgbClr val="000000"/>
                     </a:solidFill>
@@ -9893,7 +9898,7 @@
               </a:ln>
               <a:extLst>
                 <a:ext uri="{91240B29-F687-4f45-9708-019B960494DF}">
-                  <a14:hiddenLine xmlns:a14="http://schemas.microsoft.com/office/drawing/2010/main" xmlns="" w="9525">
+                  <a14:hiddenLine xmlns="" xmlns:a14="http://schemas.microsoft.com/office/drawing/2010/main" w="9525">
                     <a:solidFill>
                       <a:srgbClr val="000000"/>
                     </a:solidFill>
@@ -9955,7 +9960,7 @@
               </a:ln>
               <a:extLst>
                 <a:ext uri="{91240B29-F687-4f45-9708-019B960494DF}">
-                  <a14:hiddenLine xmlns:a14="http://schemas.microsoft.com/office/drawing/2010/main" xmlns="" w="9525">
+                  <a14:hiddenLine xmlns="" xmlns:a14="http://schemas.microsoft.com/office/drawing/2010/main" w="9525">
                     <a:solidFill>
                       <a:srgbClr val="000000"/>
                     </a:solidFill>
@@ -10045,7 +10050,7 @@
               </a:ln>
               <a:extLst>
                 <a:ext uri="{91240B29-F687-4f45-9708-019B960494DF}">
-                  <a14:hiddenLine xmlns:a14="http://schemas.microsoft.com/office/drawing/2010/main" xmlns="" w="9525">
+                  <a14:hiddenLine xmlns="" xmlns:a14="http://schemas.microsoft.com/office/drawing/2010/main" w="9525">
                     <a:solidFill>
                       <a:srgbClr val="000000"/>
                     </a:solidFill>
@@ -10135,7 +10140,7 @@
               </a:ln>
               <a:extLst>
                 <a:ext uri="{91240B29-F687-4f45-9708-019B960494DF}">
-                  <a14:hiddenLine xmlns:a14="http://schemas.microsoft.com/office/drawing/2010/main" xmlns="" w="9525">
+                  <a14:hiddenLine xmlns="" xmlns:a14="http://schemas.microsoft.com/office/drawing/2010/main" w="9525">
                     <a:solidFill>
                       <a:srgbClr val="000000"/>
                     </a:solidFill>
@@ -10197,7 +10202,7 @@
               </a:ln>
               <a:extLst>
                 <a:ext uri="{91240B29-F687-4f45-9708-019B960494DF}">
-                  <a14:hiddenLine xmlns:a14="http://schemas.microsoft.com/office/drawing/2010/main" xmlns="" w="9525">
+                  <a14:hiddenLine xmlns="" xmlns:a14="http://schemas.microsoft.com/office/drawing/2010/main" w="9525">
                     <a:solidFill>
                       <a:srgbClr val="000000"/>
                     </a:solidFill>
@@ -10307,7 +10312,7 @@
               </a:ln>
               <a:extLst>
                 <a:ext uri="{91240B29-F687-4f45-9708-019B960494DF}">
-                  <a14:hiddenLine xmlns:a14="http://schemas.microsoft.com/office/drawing/2010/main" xmlns="" w="9525">
+                  <a14:hiddenLine xmlns="" xmlns:a14="http://schemas.microsoft.com/office/drawing/2010/main" w="9525">
                     <a:solidFill>
                       <a:srgbClr val="000000"/>
                     </a:solidFill>
@@ -10391,7 +10396,7 @@
               </a:ln>
               <a:extLst>
                 <a:ext uri="{91240B29-F687-4f45-9708-019B960494DF}">
-                  <a14:hiddenLine xmlns:a14="http://schemas.microsoft.com/office/drawing/2010/main" xmlns="" w="9525">
+                  <a14:hiddenLine xmlns="" xmlns:a14="http://schemas.microsoft.com/office/drawing/2010/main" w="9525">
                     <a:solidFill>
                       <a:srgbClr val="000000"/>
                     </a:solidFill>
@@ -10453,7 +10458,7 @@
               </a:ln>
               <a:extLst>
                 <a:ext uri="{91240B29-F687-4f45-9708-019B960494DF}">
-                  <a14:hiddenLine xmlns:a14="http://schemas.microsoft.com/office/drawing/2010/main" xmlns="" w="9525">
+                  <a14:hiddenLine xmlns="" xmlns:a14="http://schemas.microsoft.com/office/drawing/2010/main" w="9525">
                     <a:solidFill>
                       <a:srgbClr val="000000"/>
                     </a:solidFill>
@@ -10515,7 +10520,7 @@
               </a:ln>
               <a:extLst>
                 <a:ext uri="{91240B29-F687-4f45-9708-019B960494DF}">
-                  <a14:hiddenLine xmlns:a14="http://schemas.microsoft.com/office/drawing/2010/main" xmlns="" w="9525">
+                  <a14:hiddenLine xmlns="" xmlns:a14="http://schemas.microsoft.com/office/drawing/2010/main" w="9525">
                     <a:solidFill>
                       <a:srgbClr val="000000"/>
                     </a:solidFill>
@@ -10605,7 +10610,7 @@
               </a:ln>
               <a:extLst>
                 <a:ext uri="{91240B29-F687-4f45-9708-019B960494DF}">
-                  <a14:hiddenLine xmlns:a14="http://schemas.microsoft.com/office/drawing/2010/main" xmlns="" w="9525">
+                  <a14:hiddenLine xmlns="" xmlns:a14="http://schemas.microsoft.com/office/drawing/2010/main" w="9525">
                     <a:solidFill>
                       <a:srgbClr val="000000"/>
                     </a:solidFill>
@@ -10639,7 +10644,7 @@
               </a:ln>
               <a:extLst>
                 <a:ext uri="{91240B29-F687-4f45-9708-019B960494DF}">
-                  <a14:hiddenLine xmlns:a14="http://schemas.microsoft.com/office/drawing/2010/main" xmlns="" w="9525">
+                  <a14:hiddenLine xmlns="" xmlns:a14="http://schemas.microsoft.com/office/drawing/2010/main" w="9525">
                     <a:solidFill>
                       <a:srgbClr val="000000"/>
                     </a:solidFill>
@@ -10704,7 +10709,7 @@
               </a:ln>
               <a:extLst>
                 <a:ext uri="{91240B29-F687-4f45-9708-019B960494DF}">
-                  <a14:hiddenLine xmlns:a14="http://schemas.microsoft.com/office/drawing/2010/main" xmlns="" w="9525">
+                  <a14:hiddenLine xmlns="" xmlns:a14="http://schemas.microsoft.com/office/drawing/2010/main" w="9525">
                     <a:solidFill>
                       <a:srgbClr val="000000"/>
                     </a:solidFill>
@@ -10794,7 +10799,7 @@
               </a:ln>
               <a:extLst>
                 <a:ext uri="{91240B29-F687-4f45-9708-019B960494DF}">
-                  <a14:hiddenLine xmlns:a14="http://schemas.microsoft.com/office/drawing/2010/main" xmlns="" w="9525">
+                  <a14:hiddenLine xmlns="" xmlns:a14="http://schemas.microsoft.com/office/drawing/2010/main" w="9525">
                     <a:solidFill>
                       <a:srgbClr val="000000"/>
                     </a:solidFill>
@@ -10856,7 +10861,7 @@
               </a:ln>
               <a:extLst>
                 <a:ext uri="{91240B29-F687-4f45-9708-019B960494DF}">
-                  <a14:hiddenLine xmlns:a14="http://schemas.microsoft.com/office/drawing/2010/main" xmlns="" w="9525">
+                  <a14:hiddenLine xmlns="" xmlns:a14="http://schemas.microsoft.com/office/drawing/2010/main" w="9525">
                     <a:solidFill>
                       <a:srgbClr val="000000"/>
                     </a:solidFill>
@@ -10946,7 +10951,7 @@
               </a:ln>
               <a:extLst>
                 <a:ext uri="{91240B29-F687-4f45-9708-019B960494DF}">
-                  <a14:hiddenLine xmlns:a14="http://schemas.microsoft.com/office/drawing/2010/main" xmlns="" w="9525">
+                  <a14:hiddenLine xmlns="" xmlns:a14="http://schemas.microsoft.com/office/drawing/2010/main" w="9525">
                     <a:solidFill>
                       <a:srgbClr val="000000"/>
                     </a:solidFill>
@@ -11011,7 +11016,7 @@
               </a:ln>
               <a:extLst>
                 <a:ext uri="{91240B29-F687-4f45-9708-019B960494DF}">
-                  <a14:hiddenLine xmlns:a14="http://schemas.microsoft.com/office/drawing/2010/main" xmlns="" w="9525">
+                  <a14:hiddenLine xmlns="" xmlns:a14="http://schemas.microsoft.com/office/drawing/2010/main" w="9525">
                     <a:solidFill>
                       <a:srgbClr val="000000"/>
                     </a:solidFill>
@@ -11073,7 +11078,7 @@
               </a:ln>
               <a:extLst>
                 <a:ext uri="{91240B29-F687-4f45-9708-019B960494DF}">
-                  <a14:hiddenLine xmlns:a14="http://schemas.microsoft.com/office/drawing/2010/main" xmlns="" w="9525">
+                  <a14:hiddenLine xmlns="" xmlns:a14="http://schemas.microsoft.com/office/drawing/2010/main" w="9525">
                     <a:solidFill>
                       <a:srgbClr val="000000"/>
                     </a:solidFill>
@@ -11163,7 +11168,7 @@
               </a:ln>
               <a:extLst>
                 <a:ext uri="{91240B29-F687-4f45-9708-019B960494DF}">
-                  <a14:hiddenLine xmlns:a14="http://schemas.microsoft.com/office/drawing/2010/main" xmlns="" w="9525">
+                  <a14:hiddenLine xmlns="" xmlns:a14="http://schemas.microsoft.com/office/drawing/2010/main" w="9525">
                     <a:solidFill>
                       <a:srgbClr val="000000"/>
                     </a:solidFill>
@@ -11253,7 +11258,7 @@
               </a:ln>
               <a:extLst>
                 <a:ext uri="{91240B29-F687-4f45-9708-019B960494DF}">
-                  <a14:hiddenLine xmlns:a14="http://schemas.microsoft.com/office/drawing/2010/main" xmlns="" w="9525">
+                  <a14:hiddenLine xmlns="" xmlns:a14="http://schemas.microsoft.com/office/drawing/2010/main" w="9525">
                     <a:solidFill>
                       <a:srgbClr val="000000"/>
                     </a:solidFill>
@@ -11318,7 +11323,7 @@
               </a:ln>
               <a:extLst>
                 <a:ext uri="{91240B29-F687-4f45-9708-019B960494DF}">
-                  <a14:hiddenLine xmlns:a14="http://schemas.microsoft.com/office/drawing/2010/main" xmlns="" w="9525">
+                  <a14:hiddenLine xmlns="" xmlns:a14="http://schemas.microsoft.com/office/drawing/2010/main" w="9525">
                     <a:solidFill>
                       <a:srgbClr val="000000"/>
                     </a:solidFill>
@@ -11438,7 +11443,7 @@
               </a:ln>
               <a:extLst>
                 <a:ext uri="{91240B29-F687-4f45-9708-019B960494DF}">
-                  <a14:hiddenLine xmlns:a14="http://schemas.microsoft.com/office/drawing/2010/main" xmlns="" w="9525">
+                  <a14:hiddenLine xmlns="" xmlns:a14="http://schemas.microsoft.com/office/drawing/2010/main" w="9525">
                     <a:solidFill>
                       <a:srgbClr val="000000"/>
                     </a:solidFill>
@@ -11519,7 +11524,7 @@
               </a:ln>
               <a:extLst>
                 <a:ext uri="{91240B29-F687-4f45-9708-019B960494DF}">
-                  <a14:hiddenLine xmlns:a14="http://schemas.microsoft.com/office/drawing/2010/main" xmlns="" w="9525">
+                  <a14:hiddenLine xmlns="" xmlns:a14="http://schemas.microsoft.com/office/drawing/2010/main" w="9525">
                     <a:solidFill>
                       <a:srgbClr val="000000"/>
                     </a:solidFill>
@@ -11634,7 +11639,7 @@
               </a:ln>
               <a:extLst>
                 <a:ext uri="{91240B29-F687-4f45-9708-019B960494DF}">
-                  <a14:hiddenLine xmlns:a14="http://schemas.microsoft.com/office/drawing/2010/main" xmlns="" w="9525">
+                  <a14:hiddenLine xmlns="" xmlns:a14="http://schemas.microsoft.com/office/drawing/2010/main" w="9525">
                     <a:solidFill>
                       <a:srgbClr val="000000"/>
                     </a:solidFill>
@@ -11724,7 +11729,7 @@
               </a:ln>
               <a:extLst>
                 <a:ext uri="{91240B29-F687-4f45-9708-019B960494DF}">
-                  <a14:hiddenLine xmlns:a14="http://schemas.microsoft.com/office/drawing/2010/main" xmlns="" w="9525">
+                  <a14:hiddenLine xmlns="" xmlns:a14="http://schemas.microsoft.com/office/drawing/2010/main" w="9525">
                     <a:solidFill>
                       <a:srgbClr val="000000"/>
                     </a:solidFill>
@@ -11789,7 +11794,7 @@
               </a:ln>
               <a:extLst>
                 <a:ext uri="{91240B29-F687-4f45-9708-019B960494DF}">
-                  <a14:hiddenLine xmlns:a14="http://schemas.microsoft.com/office/drawing/2010/main" xmlns="" w="9525">
+                  <a14:hiddenLine xmlns="" xmlns:a14="http://schemas.microsoft.com/office/drawing/2010/main" w="9525">
                     <a:solidFill>
                       <a:srgbClr val="000000"/>
                     </a:solidFill>
@@ -11879,7 +11884,7 @@
               </a:ln>
               <a:extLst>
                 <a:ext uri="{91240B29-F687-4f45-9708-019B960494DF}">
-                  <a14:hiddenLine xmlns:a14="http://schemas.microsoft.com/office/drawing/2010/main" xmlns="" w="9525">
+                  <a14:hiddenLine xmlns="" xmlns:a14="http://schemas.microsoft.com/office/drawing/2010/main" w="9525">
                     <a:solidFill>
                       <a:srgbClr val="000000"/>
                     </a:solidFill>
@@ -11947,7 +11952,7 @@
               </a:ln>
               <a:extLst>
                 <a:ext uri="{91240B29-F687-4f45-9708-019B960494DF}">
-                  <a14:hiddenLine xmlns:a14="http://schemas.microsoft.com/office/drawing/2010/main" xmlns="" w="9525">
+                  <a14:hiddenLine xmlns="" xmlns:a14="http://schemas.microsoft.com/office/drawing/2010/main" w="9525">
                     <a:solidFill>
                       <a:srgbClr val="000000"/>
                     </a:solidFill>
@@ -12037,7 +12042,7 @@
               </a:ln>
               <a:extLst>
                 <a:ext uri="{91240B29-F687-4f45-9708-019B960494DF}">
-                  <a14:hiddenLine xmlns:a14="http://schemas.microsoft.com/office/drawing/2010/main" xmlns="" w="9525">
+                  <a14:hiddenLine xmlns="" xmlns:a14="http://schemas.microsoft.com/office/drawing/2010/main" w="9525">
                     <a:solidFill>
                       <a:srgbClr val="000000"/>
                     </a:solidFill>
@@ -12105,7 +12110,7 @@
               </a:ln>
               <a:extLst>
                 <a:ext uri="{91240B29-F687-4f45-9708-019B960494DF}">
-                  <a14:hiddenLine xmlns:a14="http://schemas.microsoft.com/office/drawing/2010/main" xmlns="" w="9525">
+                  <a14:hiddenLine xmlns="" xmlns:a14="http://schemas.microsoft.com/office/drawing/2010/main" w="9525">
                     <a:solidFill>
                       <a:srgbClr val="000000"/>
                     </a:solidFill>
@@ -12195,7 +12200,7 @@
               </a:ln>
               <a:extLst>
                 <a:ext uri="{91240B29-F687-4f45-9708-019B960494DF}">
-                  <a14:hiddenLine xmlns:a14="http://schemas.microsoft.com/office/drawing/2010/main" xmlns="" w="9525">
+                  <a14:hiddenLine xmlns="" xmlns:a14="http://schemas.microsoft.com/office/drawing/2010/main" w="9525">
                     <a:solidFill>
                       <a:srgbClr val="000000"/>
                     </a:solidFill>
@@ -12229,7 +12234,7 @@
               </a:ln>
               <a:extLst>
                 <a:ext uri="{91240B29-F687-4f45-9708-019B960494DF}">
-                  <a14:hiddenLine xmlns:a14="http://schemas.microsoft.com/office/drawing/2010/main" xmlns="" w="9525">
+                  <a14:hiddenLine xmlns="" xmlns:a14="http://schemas.microsoft.com/office/drawing/2010/main" w="9525">
                     <a:solidFill>
                       <a:srgbClr val="000000"/>
                     </a:solidFill>
@@ -13182,13 +13187,42 @@
           <a:chExt cx="0" cy="0"/>
         </a:xfrm>
       </p:grpSpPr>
+      <p:sp>
+        <p:nvSpPr>
+          <p:cNvPr id="7" name="Titre 6"/>
+          <p:cNvSpPr>
+            <a:spLocks noGrp="1"/>
+          </p:cNvSpPr>
+          <p:nvPr>
+            <p:ph type="title"/>
+          </p:nvPr>
+        </p:nvSpPr>
+        <p:spPr>
+          <a:xfrm>
+            <a:off x="1141413" y="618518"/>
+            <a:ext cx="9905998" cy="1478570"/>
+          </a:xfrm>
+        </p:spPr>
+        <p:txBody>
+          <a:bodyPr/>
+          <a:lstStyle/>
+          <a:p>
+            <a:r>
+              <a:rPr lang="fr-FR" dirty="0"/>
+              <a:t>Schéma</a:t>
+            </a:r>
+          </a:p>
+        </p:txBody>
+      </p:sp>
       <p:pic>
         <p:nvPicPr>
-          <p:cNvPr id="4" name="Image 3"/>
+          <p:cNvPr id="9" name="Espace réservé du contenu 8"/>
           <p:cNvPicPr>
-            <a:picLocks noChangeAspect="1"/>
+            <a:picLocks noGrp="1" noChangeAspect="1"/>
           </p:cNvPicPr>
-          <p:nvPr/>
+          <p:nvPr>
+            <p:ph idx="1"/>
+          </p:nvPr>
         </p:nvPicPr>
         <p:blipFill>
           <a:blip r:embed="rId2">
@@ -13204,37 +13238,28 @@
         </p:blipFill>
         <p:spPr>
           <a:xfrm>
-            <a:off x="0" y="0"/>
-            <a:ext cx="12192001" cy="6858000"/>
+            <a:off x="2301310" y="1676401"/>
+            <a:ext cx="7975011" cy="4928148"/>
           </a:xfrm>
           <a:prstGeom prst="rect">
             <a:avLst/>
           </a:prstGeom>
+          <a:ln w="38100" cap="sq">
+            <a:solidFill>
+              <a:srgbClr val="000000"/>
+            </a:solidFill>
+            <a:prstDash val="solid"/>
+            <a:miter lim="800000"/>
+          </a:ln>
+          <a:effectLst>
+            <a:outerShdw blurRad="50800" dist="38100" dir="2700000" algn="tl" rotWithShape="0">
+              <a:srgbClr val="000000">
+                <a:alpha val="43000"/>
+              </a:srgbClr>
+            </a:outerShdw>
+          </a:effectLst>
         </p:spPr>
       </p:pic>
-      <p:sp>
-        <p:nvSpPr>
-          <p:cNvPr id="5" name="Espace réservé de la date 4"/>
-          <p:cNvSpPr>
-            <a:spLocks noGrp="1"/>
-          </p:cNvSpPr>
-          <p:nvPr>
-            <p:ph type="dt" sz="half" idx="10"/>
-          </p:nvPr>
-        </p:nvSpPr>
-        <p:spPr/>
-        <p:txBody>
-          <a:bodyPr/>
-          <a:lstStyle/>
-          <a:p>
-            <a:fld id="{60E12785-E76D-4C11-85E4-10D91E39A475}" type="datetime1">
-              <a:rPr lang="fr-FR" smtClean="0"/>
-              <a:t>29/08/2016</a:t>
-            </a:fld>
-            <a:endParaRPr lang="en-GB"/>
-          </a:p>
-        </p:txBody>
-      </p:sp>
       <p:sp>
         <p:nvSpPr>
           <p:cNvPr id="6" name="Espace réservé du numéro de diapositive 5"/>

</xml_diff>

<commit_message>
Modif des slides (ajout du ventilo)
</commit_message>
<xml_diff>
--- a/Cahier de charge/Smart Windows.pptx
+++ b/Cahier de charge/Smart Windows.pptx
@@ -525,7 +525,7 @@
           <a:noFill/>
           <a:extLst>
             <a:ext uri="{909E8E84-426E-40dd-AFC4-6F175D3DCCD1}">
-              <a14:hiddenFill xmlns:a14="http://schemas.microsoft.com/office/drawing/2010/main" xmlns="">
+              <a14:hiddenFill xmlns="" xmlns:a14="http://schemas.microsoft.com/office/drawing/2010/main">
                 <a:solidFill>
                   <a:srgbClr val="FFFFFF"/>
                 </a:solidFill>
@@ -584,7 +584,7 @@
             </a:ln>
             <a:extLst>
               <a:ext uri="{91240B29-F687-4f45-9708-019B960494DF}">
-                <a14:hiddenLine xmlns:a14="http://schemas.microsoft.com/office/drawing/2010/main" xmlns="" w="9525">
+                <a14:hiddenLine xmlns="" xmlns:a14="http://schemas.microsoft.com/office/drawing/2010/main" w="9525">
                   <a:solidFill>
                     <a:srgbClr val="000000"/>
                   </a:solidFill>
@@ -674,7 +674,7 @@
             </a:ln>
             <a:extLst>
               <a:ext uri="{91240B29-F687-4f45-9708-019B960494DF}">
-                <a14:hiddenLine xmlns:a14="http://schemas.microsoft.com/office/drawing/2010/main" xmlns="" w="9525">
+                <a14:hiddenLine xmlns="" xmlns:a14="http://schemas.microsoft.com/office/drawing/2010/main" w="9525">
                   <a:solidFill>
                     <a:srgbClr val="000000"/>
                   </a:solidFill>
@@ -764,7 +764,7 @@
             </a:ln>
             <a:extLst>
               <a:ext uri="{91240B29-F687-4f45-9708-019B960494DF}">
-                <a14:hiddenLine xmlns:a14="http://schemas.microsoft.com/office/drawing/2010/main" xmlns="" w="9525">
+                <a14:hiddenLine xmlns="" xmlns:a14="http://schemas.microsoft.com/office/drawing/2010/main" w="9525">
                   <a:solidFill>
                     <a:srgbClr val="000000"/>
                   </a:solidFill>
@@ -798,7 +798,7 @@
             </a:ln>
             <a:extLst>
               <a:ext uri="{91240B29-F687-4f45-9708-019B960494DF}">
-                <a14:hiddenLine xmlns:a14="http://schemas.microsoft.com/office/drawing/2010/main" xmlns="" w="9525">
+                <a14:hiddenLine xmlns="" xmlns:a14="http://schemas.microsoft.com/office/drawing/2010/main" w="9525">
                   <a:solidFill>
                     <a:srgbClr val="000000"/>
                   </a:solidFill>
@@ -888,7 +888,7 @@
             </a:ln>
             <a:extLst>
               <a:ext uri="{91240B29-F687-4f45-9708-019B960494DF}">
-                <a14:hiddenLine xmlns:a14="http://schemas.microsoft.com/office/drawing/2010/main" xmlns="" w="9525">
+                <a14:hiddenLine xmlns="" xmlns:a14="http://schemas.microsoft.com/office/drawing/2010/main" w="9525">
                   <a:solidFill>
                     <a:srgbClr val="000000"/>
                   </a:solidFill>
@@ -950,7 +950,7 @@
             </a:ln>
             <a:extLst>
               <a:ext uri="{91240B29-F687-4f45-9708-019B960494DF}">
-                <a14:hiddenLine xmlns:a14="http://schemas.microsoft.com/office/drawing/2010/main" xmlns="" w="9525">
+                <a14:hiddenLine xmlns="" xmlns:a14="http://schemas.microsoft.com/office/drawing/2010/main" w="9525">
                   <a:solidFill>
                     <a:srgbClr val="000000"/>
                   </a:solidFill>
@@ -1012,7 +1012,7 @@
             </a:ln>
             <a:extLst>
               <a:ext uri="{91240B29-F687-4f45-9708-019B960494DF}">
-                <a14:hiddenLine xmlns:a14="http://schemas.microsoft.com/office/drawing/2010/main" xmlns="" w="9525">
+                <a14:hiddenLine xmlns="" xmlns:a14="http://schemas.microsoft.com/office/drawing/2010/main" w="9525">
                   <a:solidFill>
                     <a:srgbClr val="000000"/>
                   </a:solidFill>
@@ -1102,7 +1102,7 @@
             </a:ln>
             <a:extLst>
               <a:ext uri="{91240B29-F687-4f45-9708-019B960494DF}">
-                <a14:hiddenLine xmlns:a14="http://schemas.microsoft.com/office/drawing/2010/main" xmlns="" w="9525">
+                <a14:hiddenLine xmlns="" xmlns:a14="http://schemas.microsoft.com/office/drawing/2010/main" w="9525">
                   <a:solidFill>
                     <a:srgbClr val="000000"/>
                   </a:solidFill>
@@ -1164,7 +1164,7 @@
             </a:ln>
             <a:extLst>
               <a:ext uri="{91240B29-F687-4f45-9708-019B960494DF}">
-                <a14:hiddenLine xmlns:a14="http://schemas.microsoft.com/office/drawing/2010/main" xmlns="" w="9525">
+                <a14:hiddenLine xmlns="" xmlns:a14="http://schemas.microsoft.com/office/drawing/2010/main" w="9525">
                   <a:solidFill>
                     <a:srgbClr val="000000"/>
                   </a:solidFill>
@@ -1226,7 +1226,7 @@
             </a:ln>
             <a:extLst>
               <a:ext uri="{91240B29-F687-4f45-9708-019B960494DF}">
-                <a14:hiddenLine xmlns:a14="http://schemas.microsoft.com/office/drawing/2010/main" xmlns="" w="9525">
+                <a14:hiddenLine xmlns="" xmlns:a14="http://schemas.microsoft.com/office/drawing/2010/main" w="9525">
                   <a:solidFill>
                     <a:srgbClr val="000000"/>
                   </a:solidFill>
@@ -1316,7 +1316,7 @@
             </a:ln>
             <a:extLst>
               <a:ext uri="{91240B29-F687-4f45-9708-019B960494DF}">
-                <a14:hiddenLine xmlns:a14="http://schemas.microsoft.com/office/drawing/2010/main" xmlns="" w="9525">
+                <a14:hiddenLine xmlns="" xmlns:a14="http://schemas.microsoft.com/office/drawing/2010/main" w="9525">
                   <a:solidFill>
                     <a:srgbClr val="000000"/>
                   </a:solidFill>
@@ -1406,7 +1406,7 @@
             </a:ln>
             <a:extLst>
               <a:ext uri="{91240B29-F687-4f45-9708-019B960494DF}">
-                <a14:hiddenLine xmlns:a14="http://schemas.microsoft.com/office/drawing/2010/main" xmlns="" w="9525">
+                <a14:hiddenLine xmlns="" xmlns:a14="http://schemas.microsoft.com/office/drawing/2010/main" w="9525">
                   <a:solidFill>
                     <a:srgbClr val="000000"/>
                   </a:solidFill>
@@ -1468,7 +1468,7 @@
             </a:ln>
             <a:extLst>
               <a:ext uri="{91240B29-F687-4f45-9708-019B960494DF}">
-                <a14:hiddenLine xmlns:a14="http://schemas.microsoft.com/office/drawing/2010/main" xmlns="" w="9525">
+                <a14:hiddenLine xmlns="" xmlns:a14="http://schemas.microsoft.com/office/drawing/2010/main" w="9525">
                   <a:solidFill>
                     <a:srgbClr val="000000"/>
                   </a:solidFill>
@@ -1578,7 +1578,7 @@
             </a:ln>
             <a:extLst>
               <a:ext uri="{91240B29-F687-4f45-9708-019B960494DF}">
-                <a14:hiddenLine xmlns:a14="http://schemas.microsoft.com/office/drawing/2010/main" xmlns="" w="9525">
+                <a14:hiddenLine xmlns="" xmlns:a14="http://schemas.microsoft.com/office/drawing/2010/main" w="9525">
                   <a:solidFill>
                     <a:srgbClr val="000000"/>
                   </a:solidFill>
@@ -1640,7 +1640,7 @@
             </a:ln>
             <a:extLst>
               <a:ext uri="{91240B29-F687-4f45-9708-019B960494DF}">
-                <a14:hiddenLine xmlns:a14="http://schemas.microsoft.com/office/drawing/2010/main" xmlns="" w="9525">
+                <a14:hiddenLine xmlns="" xmlns:a14="http://schemas.microsoft.com/office/drawing/2010/main" w="9525">
                   <a:solidFill>
                     <a:srgbClr val="000000"/>
                   </a:solidFill>
@@ -1730,7 +1730,7 @@
             </a:ln>
             <a:extLst>
               <a:ext uri="{91240B29-F687-4f45-9708-019B960494DF}">
-                <a14:hiddenLine xmlns:a14="http://schemas.microsoft.com/office/drawing/2010/main" xmlns="" w="9525">
+                <a14:hiddenLine xmlns="" xmlns:a14="http://schemas.microsoft.com/office/drawing/2010/main" w="9525">
                   <a:solidFill>
                     <a:srgbClr val="000000"/>
                   </a:solidFill>
@@ -1820,7 +1820,7 @@
             </a:ln>
             <a:extLst>
               <a:ext uri="{91240B29-F687-4f45-9708-019B960494DF}">
-                <a14:hiddenLine xmlns:a14="http://schemas.microsoft.com/office/drawing/2010/main" xmlns="" w="9525">
+                <a14:hiddenLine xmlns="" xmlns:a14="http://schemas.microsoft.com/office/drawing/2010/main" w="9525">
                   <a:solidFill>
                     <a:srgbClr val="000000"/>
                   </a:solidFill>
@@ -1882,7 +1882,7 @@
             </a:ln>
             <a:extLst>
               <a:ext uri="{91240B29-F687-4f45-9708-019B960494DF}">
-                <a14:hiddenLine xmlns:a14="http://schemas.microsoft.com/office/drawing/2010/main" xmlns="" w="9525">
+                <a14:hiddenLine xmlns="" xmlns:a14="http://schemas.microsoft.com/office/drawing/2010/main" w="9525">
                   <a:solidFill>
                     <a:srgbClr val="000000"/>
                   </a:solidFill>
@@ -1972,7 +1972,7 @@
             </a:ln>
             <a:extLst>
               <a:ext uri="{91240B29-F687-4f45-9708-019B960494DF}">
-                <a14:hiddenLine xmlns:a14="http://schemas.microsoft.com/office/drawing/2010/main" xmlns="" w="9525">
+                <a14:hiddenLine xmlns="" xmlns:a14="http://schemas.microsoft.com/office/drawing/2010/main" w="9525">
                   <a:solidFill>
                     <a:srgbClr val="000000"/>
                   </a:solidFill>
@@ -2062,7 +2062,7 @@
             </a:ln>
             <a:extLst>
               <a:ext uri="{91240B29-F687-4f45-9708-019B960494DF}">
-                <a14:hiddenLine xmlns:a14="http://schemas.microsoft.com/office/drawing/2010/main" xmlns="" w="9525">
+                <a14:hiddenLine xmlns="" xmlns:a14="http://schemas.microsoft.com/office/drawing/2010/main" w="9525">
                   <a:solidFill>
                     <a:srgbClr val="000000"/>
                   </a:solidFill>
@@ -2118,7 +2118,7 @@
             </a:ln>
             <a:extLst>
               <a:ext uri="{91240B29-F687-4f45-9708-019B960494DF}">
-                <a14:hiddenLine xmlns:a14="http://schemas.microsoft.com/office/drawing/2010/main" xmlns="" w="9525">
+                <a14:hiddenLine xmlns="" xmlns:a14="http://schemas.microsoft.com/office/drawing/2010/main" w="9525">
                   <a:solidFill>
                     <a:srgbClr val="000000"/>
                   </a:solidFill>
@@ -2208,7 +2208,7 @@
             </a:ln>
             <a:extLst>
               <a:ext uri="{91240B29-F687-4f45-9708-019B960494DF}">
-                <a14:hiddenLine xmlns:a14="http://schemas.microsoft.com/office/drawing/2010/main" xmlns="" w="9525">
+                <a14:hiddenLine xmlns="" xmlns:a14="http://schemas.microsoft.com/office/drawing/2010/main" w="9525">
                   <a:solidFill>
                     <a:srgbClr val="000000"/>
                   </a:solidFill>
@@ -2264,7 +2264,7 @@
             </a:ln>
             <a:extLst>
               <a:ext uri="{91240B29-F687-4f45-9708-019B960494DF}">
-                <a14:hiddenLine xmlns:a14="http://schemas.microsoft.com/office/drawing/2010/main" xmlns="" w="9525">
+                <a14:hiddenLine xmlns="" xmlns:a14="http://schemas.microsoft.com/office/drawing/2010/main" w="9525">
                   <a:solidFill>
                     <a:srgbClr val="000000"/>
                   </a:solidFill>
@@ -2354,7 +2354,7 @@
             </a:ln>
             <a:extLst>
               <a:ext uri="{91240B29-F687-4f45-9708-019B960494DF}">
-                <a14:hiddenLine xmlns:a14="http://schemas.microsoft.com/office/drawing/2010/main" xmlns="" w="9525">
+                <a14:hiddenLine xmlns="" xmlns:a14="http://schemas.microsoft.com/office/drawing/2010/main" w="9525">
                   <a:solidFill>
                     <a:srgbClr val="000000"/>
                   </a:solidFill>
@@ -2422,7 +2422,7 @@
             </a:ln>
             <a:extLst>
               <a:ext uri="{91240B29-F687-4f45-9708-019B960494DF}">
-                <a14:hiddenLine xmlns:a14="http://schemas.microsoft.com/office/drawing/2010/main" xmlns="" w="9525">
+                <a14:hiddenLine xmlns="" xmlns:a14="http://schemas.microsoft.com/office/drawing/2010/main" w="9525">
                   <a:solidFill>
                     <a:srgbClr val="000000"/>
                   </a:solidFill>
@@ -2512,7 +2512,7 @@
             </a:ln>
             <a:extLst>
               <a:ext uri="{91240B29-F687-4f45-9708-019B960494DF}">
-                <a14:hiddenLine xmlns:a14="http://schemas.microsoft.com/office/drawing/2010/main" xmlns="" w="9525">
+                <a14:hiddenLine xmlns="" xmlns:a14="http://schemas.microsoft.com/office/drawing/2010/main" w="9525">
                   <a:solidFill>
                     <a:srgbClr val="000000"/>
                   </a:solidFill>
@@ -2580,7 +2580,7 @@
             </a:ln>
             <a:extLst>
               <a:ext uri="{91240B29-F687-4f45-9708-019B960494DF}">
-                <a14:hiddenLine xmlns:a14="http://schemas.microsoft.com/office/drawing/2010/main" xmlns="" w="9525">
+                <a14:hiddenLine xmlns="" xmlns:a14="http://schemas.microsoft.com/office/drawing/2010/main" w="9525">
                   <a:solidFill>
                     <a:srgbClr val="000000"/>
                   </a:solidFill>
@@ -2670,7 +2670,7 @@
             </a:ln>
             <a:extLst>
               <a:ext uri="{91240B29-F687-4f45-9708-019B960494DF}">
-                <a14:hiddenLine xmlns:a14="http://schemas.microsoft.com/office/drawing/2010/main" xmlns="" w="9525">
+                <a14:hiddenLine xmlns="" xmlns:a14="http://schemas.microsoft.com/office/drawing/2010/main" w="9525">
                   <a:solidFill>
                     <a:srgbClr val="000000"/>
                   </a:solidFill>
@@ -2704,7 +2704,7 @@
             </a:ln>
             <a:extLst>
               <a:ext uri="{91240B29-F687-4f45-9708-019B960494DF}">
-                <a14:hiddenLine xmlns:a14="http://schemas.microsoft.com/office/drawing/2010/main" xmlns="" w="9525">
+                <a14:hiddenLine xmlns="" xmlns:a14="http://schemas.microsoft.com/office/drawing/2010/main" w="9525">
                   <a:solidFill>
                     <a:srgbClr val="000000"/>
                   </a:solidFill>
@@ -2794,7 +2794,7 @@
             </a:ln>
             <a:extLst>
               <a:ext uri="{91240B29-F687-4f45-9708-019B960494DF}">
-                <a14:hiddenLine xmlns:a14="http://schemas.microsoft.com/office/drawing/2010/main" xmlns="" w="9525">
+                <a14:hiddenLine xmlns="" xmlns:a14="http://schemas.microsoft.com/office/drawing/2010/main" w="9525">
                   <a:solidFill>
                     <a:srgbClr val="000000"/>
                   </a:solidFill>
@@ -2856,7 +2856,7 @@
             </a:ln>
             <a:extLst>
               <a:ext uri="{91240B29-F687-4f45-9708-019B960494DF}">
-                <a14:hiddenLine xmlns:a14="http://schemas.microsoft.com/office/drawing/2010/main" xmlns="" w="9525">
+                <a14:hiddenLine xmlns="" xmlns:a14="http://schemas.microsoft.com/office/drawing/2010/main" w="9525">
                   <a:solidFill>
                     <a:srgbClr val="000000"/>
                   </a:solidFill>
@@ -2918,7 +2918,7 @@
             </a:ln>
             <a:extLst>
               <a:ext uri="{91240B29-F687-4f45-9708-019B960494DF}">
-                <a14:hiddenLine xmlns:a14="http://schemas.microsoft.com/office/drawing/2010/main" xmlns="" w="9525">
+                <a14:hiddenLine xmlns="" xmlns:a14="http://schemas.microsoft.com/office/drawing/2010/main" w="9525">
                   <a:solidFill>
                     <a:srgbClr val="000000"/>
                   </a:solidFill>
@@ -3008,7 +3008,7 @@
             </a:ln>
             <a:extLst>
               <a:ext uri="{91240B29-F687-4f45-9708-019B960494DF}">
-                <a14:hiddenLine xmlns:a14="http://schemas.microsoft.com/office/drawing/2010/main" xmlns="" w="9525">
+                <a14:hiddenLine xmlns="" xmlns:a14="http://schemas.microsoft.com/office/drawing/2010/main" w="9525">
                   <a:solidFill>
                     <a:srgbClr val="000000"/>
                   </a:solidFill>
@@ -3076,7 +3076,7 @@
             </a:ln>
             <a:extLst>
               <a:ext uri="{91240B29-F687-4f45-9708-019B960494DF}">
-                <a14:hiddenLine xmlns:a14="http://schemas.microsoft.com/office/drawing/2010/main" xmlns="" w="9525">
+                <a14:hiddenLine xmlns="" xmlns:a14="http://schemas.microsoft.com/office/drawing/2010/main" w="9525">
                   <a:solidFill>
                     <a:srgbClr val="000000"/>
                   </a:solidFill>
@@ -3138,7 +3138,7 @@
             </a:ln>
             <a:extLst>
               <a:ext uri="{91240B29-F687-4f45-9708-019B960494DF}">
-                <a14:hiddenLine xmlns:a14="http://schemas.microsoft.com/office/drawing/2010/main" xmlns="" w="9525">
+                <a14:hiddenLine xmlns="" xmlns:a14="http://schemas.microsoft.com/office/drawing/2010/main" w="9525">
                   <a:solidFill>
                     <a:srgbClr val="000000"/>
                   </a:solidFill>
@@ -3228,7 +3228,7 @@
             </a:ln>
             <a:extLst>
               <a:ext uri="{91240B29-F687-4f45-9708-019B960494DF}">
-                <a14:hiddenLine xmlns:a14="http://schemas.microsoft.com/office/drawing/2010/main" xmlns="" w="9525">
+                <a14:hiddenLine xmlns="" xmlns:a14="http://schemas.microsoft.com/office/drawing/2010/main" w="9525">
                   <a:solidFill>
                     <a:srgbClr val="000000"/>
                   </a:solidFill>
@@ -3290,7 +3290,7 @@
             </a:ln>
             <a:extLst>
               <a:ext uri="{91240B29-F687-4f45-9708-019B960494DF}">
-                <a14:hiddenLine xmlns:a14="http://schemas.microsoft.com/office/drawing/2010/main" xmlns="" w="9525">
+                <a14:hiddenLine xmlns="" xmlns:a14="http://schemas.microsoft.com/office/drawing/2010/main" w="9525">
                   <a:solidFill>
                     <a:srgbClr val="000000"/>
                   </a:solidFill>
@@ -3380,7 +3380,7 @@
             </a:ln>
             <a:extLst>
               <a:ext uri="{91240B29-F687-4f45-9708-019B960494DF}">
-                <a14:hiddenLine xmlns:a14="http://schemas.microsoft.com/office/drawing/2010/main" xmlns="" w="9525">
+                <a14:hiddenLine xmlns="" xmlns:a14="http://schemas.microsoft.com/office/drawing/2010/main" w="9525">
                   <a:solidFill>
                     <a:srgbClr val="000000"/>
                   </a:solidFill>
@@ -3442,7 +3442,7 @@
             </a:ln>
             <a:extLst>
               <a:ext uri="{91240B29-F687-4f45-9708-019B960494DF}">
-                <a14:hiddenLine xmlns:a14="http://schemas.microsoft.com/office/drawing/2010/main" xmlns="" w="9525">
+                <a14:hiddenLine xmlns="" xmlns:a14="http://schemas.microsoft.com/office/drawing/2010/main" w="9525">
                   <a:solidFill>
                     <a:srgbClr val="000000"/>
                   </a:solidFill>
@@ -3532,7 +3532,7 @@
             </a:ln>
             <a:extLst>
               <a:ext uri="{91240B29-F687-4f45-9708-019B960494DF}">
-                <a14:hiddenLine xmlns:a14="http://schemas.microsoft.com/office/drawing/2010/main" xmlns="" w="9525">
+                <a14:hiddenLine xmlns="" xmlns:a14="http://schemas.microsoft.com/office/drawing/2010/main" w="9525">
                   <a:solidFill>
                     <a:srgbClr val="000000"/>
                   </a:solidFill>
@@ -3566,7 +3566,7 @@
             </a:ln>
             <a:extLst>
               <a:ext uri="{91240B29-F687-4f45-9708-019B960494DF}">
-                <a14:hiddenLine xmlns:a14="http://schemas.microsoft.com/office/drawing/2010/main" xmlns="" w="9525">
+                <a14:hiddenLine xmlns="" xmlns:a14="http://schemas.microsoft.com/office/drawing/2010/main" w="9525">
                   <a:solidFill>
                     <a:srgbClr val="000000"/>
                   </a:solidFill>
@@ -3631,7 +3631,7 @@
             </a:ln>
             <a:extLst>
               <a:ext uri="{91240B29-F687-4f45-9708-019B960494DF}">
-                <a14:hiddenLine xmlns:a14="http://schemas.microsoft.com/office/drawing/2010/main" xmlns="" w="9525">
+                <a14:hiddenLine xmlns="" xmlns:a14="http://schemas.microsoft.com/office/drawing/2010/main" w="9525">
                   <a:solidFill>
                     <a:srgbClr val="000000"/>
                   </a:solidFill>
@@ -3721,7 +3721,7 @@
             </a:ln>
             <a:extLst>
               <a:ext uri="{91240B29-F687-4f45-9708-019B960494DF}">
-                <a14:hiddenLine xmlns:a14="http://schemas.microsoft.com/office/drawing/2010/main" xmlns="" w="9525">
+                <a14:hiddenLine xmlns="" xmlns:a14="http://schemas.microsoft.com/office/drawing/2010/main" w="9525">
                   <a:solidFill>
                     <a:srgbClr val="000000"/>
                   </a:solidFill>
@@ -3783,7 +3783,7 @@
             </a:ln>
             <a:extLst>
               <a:ext uri="{91240B29-F687-4f45-9708-019B960494DF}">
-                <a14:hiddenLine xmlns:a14="http://schemas.microsoft.com/office/drawing/2010/main" xmlns="" w="9525">
+                <a14:hiddenLine xmlns="" xmlns:a14="http://schemas.microsoft.com/office/drawing/2010/main" w="9525">
                   <a:solidFill>
                     <a:srgbClr val="000000"/>
                   </a:solidFill>
@@ -3873,7 +3873,7 @@
             </a:ln>
             <a:extLst>
               <a:ext uri="{91240B29-F687-4f45-9708-019B960494DF}">
-                <a14:hiddenLine xmlns:a14="http://schemas.microsoft.com/office/drawing/2010/main" xmlns="" w="9525">
+                <a14:hiddenLine xmlns="" xmlns:a14="http://schemas.microsoft.com/office/drawing/2010/main" w="9525">
                   <a:solidFill>
                     <a:srgbClr val="000000"/>
                   </a:solidFill>
@@ -3963,7 +3963,7 @@
             </a:ln>
             <a:extLst>
               <a:ext uri="{91240B29-F687-4f45-9708-019B960494DF}">
-                <a14:hiddenLine xmlns:a14="http://schemas.microsoft.com/office/drawing/2010/main" xmlns="" w="9525">
+                <a14:hiddenLine xmlns="" xmlns:a14="http://schemas.microsoft.com/office/drawing/2010/main" w="9525">
                   <a:solidFill>
                     <a:srgbClr val="000000"/>
                   </a:solidFill>
@@ -4028,7 +4028,7 @@
             </a:ln>
             <a:extLst>
               <a:ext uri="{91240B29-F687-4f45-9708-019B960494DF}">
-                <a14:hiddenLine xmlns:a14="http://schemas.microsoft.com/office/drawing/2010/main" xmlns="" w="9525">
+                <a14:hiddenLine xmlns="" xmlns:a14="http://schemas.microsoft.com/office/drawing/2010/main" w="9525">
                   <a:solidFill>
                     <a:srgbClr val="000000"/>
                   </a:solidFill>
@@ -4090,7 +4090,7 @@
             </a:ln>
             <a:extLst>
               <a:ext uri="{91240B29-F687-4f45-9708-019B960494DF}">
-                <a14:hiddenLine xmlns:a14="http://schemas.microsoft.com/office/drawing/2010/main" xmlns="" w="9525">
+                <a14:hiddenLine xmlns="" xmlns:a14="http://schemas.microsoft.com/office/drawing/2010/main" w="9525">
                   <a:solidFill>
                     <a:srgbClr val="000000"/>
                   </a:solidFill>
@@ -4180,7 +4180,7 @@
             </a:ln>
             <a:extLst>
               <a:ext uri="{91240B29-F687-4f45-9708-019B960494DF}">
-                <a14:hiddenLine xmlns:a14="http://schemas.microsoft.com/office/drawing/2010/main" xmlns="" w="9525">
+                <a14:hiddenLine xmlns="" xmlns:a14="http://schemas.microsoft.com/office/drawing/2010/main" w="9525">
                   <a:solidFill>
                     <a:srgbClr val="000000"/>
                   </a:solidFill>
@@ -4270,7 +4270,7 @@
             </a:ln>
             <a:extLst>
               <a:ext uri="{91240B29-F687-4f45-9708-019B960494DF}">
-                <a14:hiddenLine xmlns:a14="http://schemas.microsoft.com/office/drawing/2010/main" xmlns="" w="9525">
+                <a14:hiddenLine xmlns="" xmlns:a14="http://schemas.microsoft.com/office/drawing/2010/main" w="9525">
                   <a:solidFill>
                     <a:srgbClr val="000000"/>
                   </a:solidFill>
@@ -4332,7 +4332,7 @@
             </a:ln>
             <a:extLst>
               <a:ext uri="{91240B29-F687-4f45-9708-019B960494DF}">
-                <a14:hiddenLine xmlns:a14="http://schemas.microsoft.com/office/drawing/2010/main" xmlns="" w="9525">
+                <a14:hiddenLine xmlns="" xmlns:a14="http://schemas.microsoft.com/office/drawing/2010/main" w="9525">
                   <a:solidFill>
                     <a:srgbClr val="000000"/>
                   </a:solidFill>
@@ -4452,7 +4452,7 @@
             </a:ln>
             <a:extLst>
               <a:ext uri="{91240B29-F687-4f45-9708-019B960494DF}">
-                <a14:hiddenLine xmlns:a14="http://schemas.microsoft.com/office/drawing/2010/main" xmlns="" w="9525">
+                <a14:hiddenLine xmlns="" xmlns:a14="http://schemas.microsoft.com/office/drawing/2010/main" w="9525">
                   <a:solidFill>
                     <a:srgbClr val="000000"/>
                   </a:solidFill>
@@ -4520,7 +4520,7 @@
             </a:ln>
             <a:extLst>
               <a:ext uri="{91240B29-F687-4f45-9708-019B960494DF}">
-                <a14:hiddenLine xmlns:a14="http://schemas.microsoft.com/office/drawing/2010/main" xmlns="" w="9525">
+                <a14:hiddenLine xmlns="" xmlns:a14="http://schemas.microsoft.com/office/drawing/2010/main" w="9525">
                   <a:solidFill>
                     <a:srgbClr val="000000"/>
                   </a:solidFill>
@@ -4610,7 +4610,7 @@
             </a:ln>
             <a:extLst>
               <a:ext uri="{91240B29-F687-4f45-9708-019B960494DF}">
-                <a14:hiddenLine xmlns:a14="http://schemas.microsoft.com/office/drawing/2010/main" xmlns="" w="9525">
+                <a14:hiddenLine xmlns="" xmlns:a14="http://schemas.microsoft.com/office/drawing/2010/main" w="9525">
                   <a:solidFill>
                     <a:srgbClr val="000000"/>
                   </a:solidFill>
@@ -9430,7 +9430,7 @@
           <a:noFill/>
           <a:extLst>
             <a:ext uri="{909E8E84-426E-40dd-AFC4-6F175D3DCCD1}">
-              <a14:hiddenFill xmlns:a14="http://schemas.microsoft.com/office/drawing/2010/main" xmlns="">
+              <a14:hiddenFill xmlns="" xmlns:a14="http://schemas.microsoft.com/office/drawing/2010/main">
                 <a:solidFill>
                   <a:srgbClr val="FFFFFF"/>
                 </a:solidFill>
@@ -9504,7 +9504,7 @@
               </a:ln>
               <a:extLst>
                 <a:ext uri="{91240B29-F687-4f45-9708-019B960494DF}">
-                  <a14:hiddenLine xmlns:a14="http://schemas.microsoft.com/office/drawing/2010/main" xmlns="" w="9525">
+                  <a14:hiddenLine xmlns="" xmlns:a14="http://schemas.microsoft.com/office/drawing/2010/main" w="9525">
                     <a:solidFill>
                       <a:srgbClr val="000000"/>
                     </a:solidFill>
@@ -9594,7 +9594,7 @@
               </a:ln>
               <a:extLst>
                 <a:ext uri="{91240B29-F687-4f45-9708-019B960494DF}">
-                  <a14:hiddenLine xmlns:a14="http://schemas.microsoft.com/office/drawing/2010/main" xmlns="" w="9525">
+                  <a14:hiddenLine xmlns="" xmlns:a14="http://schemas.microsoft.com/office/drawing/2010/main" w="9525">
                     <a:solidFill>
                       <a:srgbClr val="000000"/>
                     </a:solidFill>
@@ -9684,7 +9684,7 @@
               </a:ln>
               <a:extLst>
                 <a:ext uri="{91240B29-F687-4f45-9708-019B960494DF}">
-                  <a14:hiddenLine xmlns:a14="http://schemas.microsoft.com/office/drawing/2010/main" xmlns="" w="9525">
+                  <a14:hiddenLine xmlns="" xmlns:a14="http://schemas.microsoft.com/office/drawing/2010/main" w="9525">
                     <a:solidFill>
                       <a:srgbClr val="000000"/>
                     </a:solidFill>
@@ -9746,7 +9746,7 @@
               </a:ln>
               <a:extLst>
                 <a:ext uri="{91240B29-F687-4f45-9708-019B960494DF}">
-                  <a14:hiddenLine xmlns:a14="http://schemas.microsoft.com/office/drawing/2010/main" xmlns="" w="9525">
+                  <a14:hiddenLine xmlns="" xmlns:a14="http://schemas.microsoft.com/office/drawing/2010/main" w="9525">
                     <a:solidFill>
                       <a:srgbClr val="000000"/>
                     </a:solidFill>
@@ -9836,7 +9836,7 @@
               </a:ln>
               <a:extLst>
                 <a:ext uri="{91240B29-F687-4f45-9708-019B960494DF}">
-                  <a14:hiddenLine xmlns:a14="http://schemas.microsoft.com/office/drawing/2010/main" xmlns="" w="9525">
+                  <a14:hiddenLine xmlns="" xmlns:a14="http://schemas.microsoft.com/office/drawing/2010/main" w="9525">
                     <a:solidFill>
                       <a:srgbClr val="000000"/>
                     </a:solidFill>
@@ -9898,7 +9898,7 @@
               </a:ln>
               <a:extLst>
                 <a:ext uri="{91240B29-F687-4f45-9708-019B960494DF}">
-                  <a14:hiddenLine xmlns:a14="http://schemas.microsoft.com/office/drawing/2010/main" xmlns="" w="9525">
+                  <a14:hiddenLine xmlns="" xmlns:a14="http://schemas.microsoft.com/office/drawing/2010/main" w="9525">
                     <a:solidFill>
                       <a:srgbClr val="000000"/>
                     </a:solidFill>
@@ -9960,7 +9960,7 @@
               </a:ln>
               <a:extLst>
                 <a:ext uri="{91240B29-F687-4f45-9708-019B960494DF}">
-                  <a14:hiddenLine xmlns:a14="http://schemas.microsoft.com/office/drawing/2010/main" xmlns="" w="9525">
+                  <a14:hiddenLine xmlns="" xmlns:a14="http://schemas.microsoft.com/office/drawing/2010/main" w="9525">
                     <a:solidFill>
                       <a:srgbClr val="000000"/>
                     </a:solidFill>
@@ -10050,7 +10050,7 @@
               </a:ln>
               <a:extLst>
                 <a:ext uri="{91240B29-F687-4f45-9708-019B960494DF}">
-                  <a14:hiddenLine xmlns:a14="http://schemas.microsoft.com/office/drawing/2010/main" xmlns="" w="9525">
+                  <a14:hiddenLine xmlns="" xmlns:a14="http://schemas.microsoft.com/office/drawing/2010/main" w="9525">
                     <a:solidFill>
                       <a:srgbClr val="000000"/>
                     </a:solidFill>
@@ -10140,7 +10140,7 @@
               </a:ln>
               <a:extLst>
                 <a:ext uri="{91240B29-F687-4f45-9708-019B960494DF}">
-                  <a14:hiddenLine xmlns:a14="http://schemas.microsoft.com/office/drawing/2010/main" xmlns="" w="9525">
+                  <a14:hiddenLine xmlns="" xmlns:a14="http://schemas.microsoft.com/office/drawing/2010/main" w="9525">
                     <a:solidFill>
                       <a:srgbClr val="000000"/>
                     </a:solidFill>
@@ -10202,7 +10202,7 @@
               </a:ln>
               <a:extLst>
                 <a:ext uri="{91240B29-F687-4f45-9708-019B960494DF}">
-                  <a14:hiddenLine xmlns:a14="http://schemas.microsoft.com/office/drawing/2010/main" xmlns="" w="9525">
+                  <a14:hiddenLine xmlns="" xmlns:a14="http://schemas.microsoft.com/office/drawing/2010/main" w="9525">
                     <a:solidFill>
                       <a:srgbClr val="000000"/>
                     </a:solidFill>
@@ -10312,7 +10312,7 @@
               </a:ln>
               <a:extLst>
                 <a:ext uri="{91240B29-F687-4f45-9708-019B960494DF}">
-                  <a14:hiddenLine xmlns:a14="http://schemas.microsoft.com/office/drawing/2010/main" xmlns="" w="9525">
+                  <a14:hiddenLine xmlns="" xmlns:a14="http://schemas.microsoft.com/office/drawing/2010/main" w="9525">
                     <a:solidFill>
                       <a:srgbClr val="000000"/>
                     </a:solidFill>
@@ -10396,7 +10396,7 @@
               </a:ln>
               <a:extLst>
                 <a:ext uri="{91240B29-F687-4f45-9708-019B960494DF}">
-                  <a14:hiddenLine xmlns:a14="http://schemas.microsoft.com/office/drawing/2010/main" xmlns="" w="9525">
+                  <a14:hiddenLine xmlns="" xmlns:a14="http://schemas.microsoft.com/office/drawing/2010/main" w="9525">
                     <a:solidFill>
                       <a:srgbClr val="000000"/>
                     </a:solidFill>
@@ -10458,7 +10458,7 @@
               </a:ln>
               <a:extLst>
                 <a:ext uri="{91240B29-F687-4f45-9708-019B960494DF}">
-                  <a14:hiddenLine xmlns:a14="http://schemas.microsoft.com/office/drawing/2010/main" xmlns="" w="9525">
+                  <a14:hiddenLine xmlns="" xmlns:a14="http://schemas.microsoft.com/office/drawing/2010/main" w="9525">
                     <a:solidFill>
                       <a:srgbClr val="000000"/>
                     </a:solidFill>
@@ -10520,7 +10520,7 @@
               </a:ln>
               <a:extLst>
                 <a:ext uri="{91240B29-F687-4f45-9708-019B960494DF}">
-                  <a14:hiddenLine xmlns:a14="http://schemas.microsoft.com/office/drawing/2010/main" xmlns="" w="9525">
+                  <a14:hiddenLine xmlns="" xmlns:a14="http://schemas.microsoft.com/office/drawing/2010/main" w="9525">
                     <a:solidFill>
                       <a:srgbClr val="000000"/>
                     </a:solidFill>
@@ -10610,7 +10610,7 @@
               </a:ln>
               <a:extLst>
                 <a:ext uri="{91240B29-F687-4f45-9708-019B960494DF}">
-                  <a14:hiddenLine xmlns:a14="http://schemas.microsoft.com/office/drawing/2010/main" xmlns="" w="9525">
+                  <a14:hiddenLine xmlns="" xmlns:a14="http://schemas.microsoft.com/office/drawing/2010/main" w="9525">
                     <a:solidFill>
                       <a:srgbClr val="000000"/>
                     </a:solidFill>
@@ -10644,7 +10644,7 @@
               </a:ln>
               <a:extLst>
                 <a:ext uri="{91240B29-F687-4f45-9708-019B960494DF}">
-                  <a14:hiddenLine xmlns:a14="http://schemas.microsoft.com/office/drawing/2010/main" xmlns="" w="9525">
+                  <a14:hiddenLine xmlns="" xmlns:a14="http://schemas.microsoft.com/office/drawing/2010/main" w="9525">
                     <a:solidFill>
                       <a:srgbClr val="000000"/>
                     </a:solidFill>
@@ -10709,7 +10709,7 @@
               </a:ln>
               <a:extLst>
                 <a:ext uri="{91240B29-F687-4f45-9708-019B960494DF}">
-                  <a14:hiddenLine xmlns:a14="http://schemas.microsoft.com/office/drawing/2010/main" xmlns="" w="9525">
+                  <a14:hiddenLine xmlns="" xmlns:a14="http://schemas.microsoft.com/office/drawing/2010/main" w="9525">
                     <a:solidFill>
                       <a:srgbClr val="000000"/>
                     </a:solidFill>
@@ -10799,7 +10799,7 @@
               </a:ln>
               <a:extLst>
                 <a:ext uri="{91240B29-F687-4f45-9708-019B960494DF}">
-                  <a14:hiddenLine xmlns:a14="http://schemas.microsoft.com/office/drawing/2010/main" xmlns="" w="9525">
+                  <a14:hiddenLine xmlns="" xmlns:a14="http://schemas.microsoft.com/office/drawing/2010/main" w="9525">
                     <a:solidFill>
                       <a:srgbClr val="000000"/>
                     </a:solidFill>
@@ -10861,7 +10861,7 @@
               </a:ln>
               <a:extLst>
                 <a:ext uri="{91240B29-F687-4f45-9708-019B960494DF}">
-                  <a14:hiddenLine xmlns:a14="http://schemas.microsoft.com/office/drawing/2010/main" xmlns="" w="9525">
+                  <a14:hiddenLine xmlns="" xmlns:a14="http://schemas.microsoft.com/office/drawing/2010/main" w="9525">
                     <a:solidFill>
                       <a:srgbClr val="000000"/>
                     </a:solidFill>
@@ -10951,7 +10951,7 @@
               </a:ln>
               <a:extLst>
                 <a:ext uri="{91240B29-F687-4f45-9708-019B960494DF}">
-                  <a14:hiddenLine xmlns:a14="http://schemas.microsoft.com/office/drawing/2010/main" xmlns="" w="9525">
+                  <a14:hiddenLine xmlns="" xmlns:a14="http://schemas.microsoft.com/office/drawing/2010/main" w="9525">
                     <a:solidFill>
                       <a:srgbClr val="000000"/>
                     </a:solidFill>
@@ -11016,7 +11016,7 @@
               </a:ln>
               <a:extLst>
                 <a:ext uri="{91240B29-F687-4f45-9708-019B960494DF}">
-                  <a14:hiddenLine xmlns:a14="http://schemas.microsoft.com/office/drawing/2010/main" xmlns="" w="9525">
+                  <a14:hiddenLine xmlns="" xmlns:a14="http://schemas.microsoft.com/office/drawing/2010/main" w="9525">
                     <a:solidFill>
                       <a:srgbClr val="000000"/>
                     </a:solidFill>
@@ -11078,7 +11078,7 @@
               </a:ln>
               <a:extLst>
                 <a:ext uri="{91240B29-F687-4f45-9708-019B960494DF}">
-                  <a14:hiddenLine xmlns:a14="http://schemas.microsoft.com/office/drawing/2010/main" xmlns="" w="9525">
+                  <a14:hiddenLine xmlns="" xmlns:a14="http://schemas.microsoft.com/office/drawing/2010/main" w="9525">
                     <a:solidFill>
                       <a:srgbClr val="000000"/>
                     </a:solidFill>
@@ -11168,7 +11168,7 @@
               </a:ln>
               <a:extLst>
                 <a:ext uri="{91240B29-F687-4f45-9708-019B960494DF}">
-                  <a14:hiddenLine xmlns:a14="http://schemas.microsoft.com/office/drawing/2010/main" xmlns="" w="9525">
+                  <a14:hiddenLine xmlns="" xmlns:a14="http://schemas.microsoft.com/office/drawing/2010/main" w="9525">
                     <a:solidFill>
                       <a:srgbClr val="000000"/>
                     </a:solidFill>
@@ -11258,7 +11258,7 @@
               </a:ln>
               <a:extLst>
                 <a:ext uri="{91240B29-F687-4f45-9708-019B960494DF}">
-                  <a14:hiddenLine xmlns:a14="http://schemas.microsoft.com/office/drawing/2010/main" xmlns="" w="9525">
+                  <a14:hiddenLine xmlns="" xmlns:a14="http://schemas.microsoft.com/office/drawing/2010/main" w="9525">
                     <a:solidFill>
                       <a:srgbClr val="000000"/>
                     </a:solidFill>
@@ -11323,7 +11323,7 @@
               </a:ln>
               <a:extLst>
                 <a:ext uri="{91240B29-F687-4f45-9708-019B960494DF}">
-                  <a14:hiddenLine xmlns:a14="http://schemas.microsoft.com/office/drawing/2010/main" xmlns="" w="9525">
+                  <a14:hiddenLine xmlns="" xmlns:a14="http://schemas.microsoft.com/office/drawing/2010/main" w="9525">
                     <a:solidFill>
                       <a:srgbClr val="000000"/>
                     </a:solidFill>
@@ -11443,7 +11443,7 @@
               </a:ln>
               <a:extLst>
                 <a:ext uri="{91240B29-F687-4f45-9708-019B960494DF}">
-                  <a14:hiddenLine xmlns:a14="http://schemas.microsoft.com/office/drawing/2010/main" xmlns="" w="9525">
+                  <a14:hiddenLine xmlns="" xmlns:a14="http://schemas.microsoft.com/office/drawing/2010/main" w="9525">
                     <a:solidFill>
                       <a:srgbClr val="000000"/>
                     </a:solidFill>
@@ -11524,7 +11524,7 @@
               </a:ln>
               <a:extLst>
                 <a:ext uri="{91240B29-F687-4f45-9708-019B960494DF}">
-                  <a14:hiddenLine xmlns:a14="http://schemas.microsoft.com/office/drawing/2010/main" xmlns="" w="9525">
+                  <a14:hiddenLine xmlns="" xmlns:a14="http://schemas.microsoft.com/office/drawing/2010/main" w="9525">
                     <a:solidFill>
                       <a:srgbClr val="000000"/>
                     </a:solidFill>
@@ -11639,7 +11639,7 @@
               </a:ln>
               <a:extLst>
                 <a:ext uri="{91240B29-F687-4f45-9708-019B960494DF}">
-                  <a14:hiddenLine xmlns:a14="http://schemas.microsoft.com/office/drawing/2010/main" xmlns="" w="9525">
+                  <a14:hiddenLine xmlns="" xmlns:a14="http://schemas.microsoft.com/office/drawing/2010/main" w="9525">
                     <a:solidFill>
                       <a:srgbClr val="000000"/>
                     </a:solidFill>
@@ -11729,7 +11729,7 @@
               </a:ln>
               <a:extLst>
                 <a:ext uri="{91240B29-F687-4f45-9708-019B960494DF}">
-                  <a14:hiddenLine xmlns:a14="http://schemas.microsoft.com/office/drawing/2010/main" xmlns="" w="9525">
+                  <a14:hiddenLine xmlns="" xmlns:a14="http://schemas.microsoft.com/office/drawing/2010/main" w="9525">
                     <a:solidFill>
                       <a:srgbClr val="000000"/>
                     </a:solidFill>
@@ -11794,7 +11794,7 @@
               </a:ln>
               <a:extLst>
                 <a:ext uri="{91240B29-F687-4f45-9708-019B960494DF}">
-                  <a14:hiddenLine xmlns:a14="http://schemas.microsoft.com/office/drawing/2010/main" xmlns="" w="9525">
+                  <a14:hiddenLine xmlns="" xmlns:a14="http://schemas.microsoft.com/office/drawing/2010/main" w="9525">
                     <a:solidFill>
                       <a:srgbClr val="000000"/>
                     </a:solidFill>
@@ -11884,7 +11884,7 @@
               </a:ln>
               <a:extLst>
                 <a:ext uri="{91240B29-F687-4f45-9708-019B960494DF}">
-                  <a14:hiddenLine xmlns:a14="http://schemas.microsoft.com/office/drawing/2010/main" xmlns="" w="9525">
+                  <a14:hiddenLine xmlns="" xmlns:a14="http://schemas.microsoft.com/office/drawing/2010/main" w="9525">
                     <a:solidFill>
                       <a:srgbClr val="000000"/>
                     </a:solidFill>
@@ -11952,7 +11952,7 @@
               </a:ln>
               <a:extLst>
                 <a:ext uri="{91240B29-F687-4f45-9708-019B960494DF}">
-                  <a14:hiddenLine xmlns:a14="http://schemas.microsoft.com/office/drawing/2010/main" xmlns="" w="9525">
+                  <a14:hiddenLine xmlns="" xmlns:a14="http://schemas.microsoft.com/office/drawing/2010/main" w="9525">
                     <a:solidFill>
                       <a:srgbClr val="000000"/>
                     </a:solidFill>
@@ -12042,7 +12042,7 @@
               </a:ln>
               <a:extLst>
                 <a:ext uri="{91240B29-F687-4f45-9708-019B960494DF}">
-                  <a14:hiddenLine xmlns:a14="http://schemas.microsoft.com/office/drawing/2010/main" xmlns="" w="9525">
+                  <a14:hiddenLine xmlns="" xmlns:a14="http://schemas.microsoft.com/office/drawing/2010/main" w="9525">
                     <a:solidFill>
                       <a:srgbClr val="000000"/>
                     </a:solidFill>
@@ -12110,7 +12110,7 @@
               </a:ln>
               <a:extLst>
                 <a:ext uri="{91240B29-F687-4f45-9708-019B960494DF}">
-                  <a14:hiddenLine xmlns:a14="http://schemas.microsoft.com/office/drawing/2010/main" xmlns="" w="9525">
+                  <a14:hiddenLine xmlns="" xmlns:a14="http://schemas.microsoft.com/office/drawing/2010/main" w="9525">
                     <a:solidFill>
                       <a:srgbClr val="000000"/>
                     </a:solidFill>
@@ -12200,7 +12200,7 @@
               </a:ln>
               <a:extLst>
                 <a:ext uri="{91240B29-F687-4f45-9708-019B960494DF}">
-                  <a14:hiddenLine xmlns:a14="http://schemas.microsoft.com/office/drawing/2010/main" xmlns="" w="9525">
+                  <a14:hiddenLine xmlns="" xmlns:a14="http://schemas.microsoft.com/office/drawing/2010/main" w="9525">
                     <a:solidFill>
                       <a:srgbClr val="000000"/>
                     </a:solidFill>
@@ -12234,7 +12234,7 @@
               </a:ln>
               <a:extLst>
                 <a:ext uri="{91240B29-F687-4f45-9708-019B960494DF}">
-                  <a14:hiddenLine xmlns:a14="http://schemas.microsoft.com/office/drawing/2010/main" xmlns="" w="9525">
+                  <a14:hiddenLine xmlns="" xmlns:a14="http://schemas.microsoft.com/office/drawing/2010/main" w="9525">
                     <a:solidFill>
                       <a:srgbClr val="000000"/>
                     </a:solidFill>
@@ -13393,7 +13393,46 @@
                 <a:spcPts val="1200"/>
               </a:spcAft>
             </a:pPr>
-            <a:endParaRPr lang="fr-FR" dirty="0"/>
+            <a:r>
+              <a:rPr lang="fr-FR" dirty="0" err="1"/>
+              <a:t>Anemometer</a:t>
+            </a:r>
+            <a:r>
+              <a:rPr lang="fr-FR" dirty="0"/>
+              <a:t> Wind Speed </a:t>
+            </a:r>
+            <a:r>
+              <a:rPr lang="fr-FR" dirty="0" err="1"/>
+              <a:t>Sensor</a:t>
+            </a:r>
+            <a:r>
+              <a:rPr lang="fr-FR" dirty="0"/>
+              <a:t> w/</a:t>
+            </a:r>
+            <a:r>
+              <a:rPr lang="fr-FR" dirty="0" err="1"/>
+              <a:t>Analog</a:t>
+            </a:r>
+            <a:r>
+              <a:rPr lang="fr-FR" dirty="0"/>
+              <a:t> Voltage Output (</a:t>
+            </a:r>
+            <a:r>
+              <a:rPr lang="fr-FR" dirty="0">
+                <a:hlinkClick r:id="rId2"/>
+              </a:rPr>
+              <a:t>lien </a:t>
+            </a:r>
+            <a:r>
+              <a:rPr lang="fr-FR" dirty="0" err="1">
+                <a:hlinkClick r:id="rId2"/>
+              </a:rPr>
+              <a:t>mouser</a:t>
+            </a:r>
+            <a:r>
+              <a:rPr lang="fr-FR" dirty="0"/>
+              <a:t>)</a:t>
+            </a:r>
           </a:p>
           <a:p>
             <a:pPr lvl="0">
@@ -13427,7 +13466,7 @@
             </a:pPr>
             <a:r>
               <a:rPr lang="fr-FR" dirty="0"/>
-              <a:t>Module Wifi</a:t>
+              <a:t>Module Wifi (Wifly)</a:t>
             </a:r>
           </a:p>
           <a:p>

</xml_diff>